<commit_message>
doc: updated tier 0 diagram
</commit_message>
<xml_diff>
--- a/doc/tier-0-diagram.pptx
+++ b/doc/tier-0-diagram.pptx
@@ -4,8 +4,14 @@
   <p:sldMasterIdLst>
     <p:sldMasterId id="2147483648" r:id="rId1"/>
   </p:sldMasterIdLst>
+  <p:notesMasterIdLst>
+    <p:notesMasterId r:id="rId6"/>
+  </p:notesMasterIdLst>
   <p:sldIdLst>
     <p:sldId id="256" r:id="rId2"/>
+    <p:sldId id="259" r:id="rId3"/>
+    <p:sldId id="257" r:id="rId4"/>
+    <p:sldId id="258" r:id="rId5"/>
   </p:sldIdLst>
   <p:sldSz cx="12192000" cy="6858000"/>
   <p:notesSz cx="6858000" cy="9144000"/>
@@ -104,7 +110,446 @@
       </a:defRPr>
     </a:lvl9pPr>
   </p:defaultTextStyle>
+  <p:extLst>
+    <p:ext uri="{EFAFB233-063F-42B5-8137-9DF3F51BA10A}">
+      <p15:sldGuideLst xmlns:p15="http://schemas.microsoft.com/office/powerpoint/2012/main"/>
+    </p:ext>
+  </p:extLst>
 </p:presentation>
+</file>
+
+<file path=ppt/notesMasters/notesMaster1.xml><?xml version="1.0" encoding="utf-8"?>
+<p:notesMaster xmlns:a="http://schemas.openxmlformats.org/drawingml/2006/main" xmlns:r="http://schemas.openxmlformats.org/officeDocument/2006/relationships" xmlns:p="http://schemas.openxmlformats.org/presentationml/2006/main">
+  <p:cSld>
+    <p:bg>
+      <p:bgRef idx="1001">
+        <a:schemeClr val="bg1"/>
+      </p:bgRef>
+    </p:bg>
+    <p:spTree>
+      <p:nvGrpSpPr>
+        <p:cNvPr id="1" name=""/>
+        <p:cNvGrpSpPr/>
+        <p:nvPr/>
+      </p:nvGrpSpPr>
+      <p:grpSpPr>
+        <a:xfrm>
+          <a:off x="0" y="0"/>
+          <a:ext cx="0" cy="0"/>
+          <a:chOff x="0" y="0"/>
+          <a:chExt cx="0" cy="0"/>
+        </a:xfrm>
+      </p:grpSpPr>
+      <p:sp>
+        <p:nvSpPr>
+          <p:cNvPr id="2" name="Header Placeholder 1"/>
+          <p:cNvSpPr>
+            <a:spLocks noGrp="1"/>
+          </p:cNvSpPr>
+          <p:nvPr>
+            <p:ph type="hdr" sz="quarter"/>
+          </p:nvPr>
+        </p:nvSpPr>
+        <p:spPr>
+          <a:xfrm>
+            <a:off x="0" y="0"/>
+            <a:ext cx="2971800" cy="458788"/>
+          </a:xfrm>
+          <a:prstGeom prst="rect">
+            <a:avLst/>
+          </a:prstGeom>
+        </p:spPr>
+        <p:txBody>
+          <a:bodyPr vert="horz" lIns="91440" tIns="45720" rIns="91440" bIns="45720" rtlCol="0"/>
+          <a:lstStyle>
+            <a:lvl1pPr algn="l">
+              <a:defRPr sz="1200"/>
+            </a:lvl1pPr>
+          </a:lstStyle>
+          <a:p>
+            <a:endParaRPr lang="en-SG"/>
+          </a:p>
+        </p:txBody>
+      </p:sp>
+      <p:sp>
+        <p:nvSpPr>
+          <p:cNvPr id="3" name="Date Placeholder 2"/>
+          <p:cNvSpPr>
+            <a:spLocks noGrp="1"/>
+          </p:cNvSpPr>
+          <p:nvPr>
+            <p:ph type="dt" idx="1"/>
+          </p:nvPr>
+        </p:nvSpPr>
+        <p:spPr>
+          <a:xfrm>
+            <a:off x="3884613" y="0"/>
+            <a:ext cx="2971800" cy="458788"/>
+          </a:xfrm>
+          <a:prstGeom prst="rect">
+            <a:avLst/>
+          </a:prstGeom>
+        </p:spPr>
+        <p:txBody>
+          <a:bodyPr vert="horz" lIns="91440" tIns="45720" rIns="91440" bIns="45720" rtlCol="0"/>
+          <a:lstStyle>
+            <a:lvl1pPr algn="r">
+              <a:defRPr sz="1200"/>
+            </a:lvl1pPr>
+          </a:lstStyle>
+          <a:p>
+            <a:fld id="{E36CAFB9-D2F2-494A-9513-78684149591B}" type="datetimeFigureOut">
+              <a:rPr lang="en-SG" smtClean="0"/>
+              <a:t>5/2/2025</a:t>
+            </a:fld>
+            <a:endParaRPr lang="en-SG"/>
+          </a:p>
+        </p:txBody>
+      </p:sp>
+      <p:sp>
+        <p:nvSpPr>
+          <p:cNvPr id="4" name="Slide Image Placeholder 3"/>
+          <p:cNvSpPr>
+            <a:spLocks noGrp="1" noRot="1" noChangeAspect="1"/>
+          </p:cNvSpPr>
+          <p:nvPr>
+            <p:ph type="sldImg" idx="2"/>
+          </p:nvPr>
+        </p:nvSpPr>
+        <p:spPr>
+          <a:xfrm>
+            <a:off x="685800" y="1143000"/>
+            <a:ext cx="5486400" cy="3086100"/>
+          </a:xfrm>
+          <a:prstGeom prst="rect">
+            <a:avLst/>
+          </a:prstGeom>
+          <a:noFill/>
+          <a:ln w="12700">
+            <a:solidFill>
+              <a:prstClr val="black"/>
+            </a:solidFill>
+          </a:ln>
+        </p:spPr>
+        <p:txBody>
+          <a:bodyPr vert="horz" lIns="91440" tIns="45720" rIns="91440" bIns="45720" rtlCol="0" anchor="ctr"/>
+          <a:lstStyle/>
+          <a:p>
+            <a:endParaRPr lang="en-SG"/>
+          </a:p>
+        </p:txBody>
+      </p:sp>
+      <p:sp>
+        <p:nvSpPr>
+          <p:cNvPr id="5" name="Notes Placeholder 4"/>
+          <p:cNvSpPr>
+            <a:spLocks noGrp="1"/>
+          </p:cNvSpPr>
+          <p:nvPr>
+            <p:ph type="body" sz="quarter" idx="3"/>
+          </p:nvPr>
+        </p:nvSpPr>
+        <p:spPr>
+          <a:xfrm>
+            <a:off x="685800" y="4400550"/>
+            <a:ext cx="5486400" cy="3600450"/>
+          </a:xfrm>
+          <a:prstGeom prst="rect">
+            <a:avLst/>
+          </a:prstGeom>
+        </p:spPr>
+        <p:txBody>
+          <a:bodyPr vert="horz" lIns="91440" tIns="45720" rIns="91440" bIns="45720" rtlCol="0"/>
+          <a:lstStyle/>
+          <a:p>
+            <a:pPr lvl="0"/>
+            <a:r>
+              <a:rPr lang="en-US"/>
+              <a:t>Click to edit Master text styles</a:t>
+            </a:r>
+          </a:p>
+          <a:p>
+            <a:pPr lvl="1"/>
+            <a:r>
+              <a:rPr lang="en-US"/>
+              <a:t>Second level</a:t>
+            </a:r>
+          </a:p>
+          <a:p>
+            <a:pPr lvl="2"/>
+            <a:r>
+              <a:rPr lang="en-US"/>
+              <a:t>Third level</a:t>
+            </a:r>
+          </a:p>
+          <a:p>
+            <a:pPr lvl="3"/>
+            <a:r>
+              <a:rPr lang="en-US"/>
+              <a:t>Fourth level</a:t>
+            </a:r>
+          </a:p>
+          <a:p>
+            <a:pPr lvl="4"/>
+            <a:r>
+              <a:rPr lang="en-US"/>
+              <a:t>Fifth level</a:t>
+            </a:r>
+            <a:endParaRPr lang="en-SG"/>
+          </a:p>
+        </p:txBody>
+      </p:sp>
+      <p:sp>
+        <p:nvSpPr>
+          <p:cNvPr id="6" name="Footer Placeholder 5"/>
+          <p:cNvSpPr>
+            <a:spLocks noGrp="1"/>
+          </p:cNvSpPr>
+          <p:nvPr>
+            <p:ph type="ftr" sz="quarter" idx="4"/>
+          </p:nvPr>
+        </p:nvSpPr>
+        <p:spPr>
+          <a:xfrm>
+            <a:off x="0" y="8685213"/>
+            <a:ext cx="2971800" cy="458787"/>
+          </a:xfrm>
+          <a:prstGeom prst="rect">
+            <a:avLst/>
+          </a:prstGeom>
+        </p:spPr>
+        <p:txBody>
+          <a:bodyPr vert="horz" lIns="91440" tIns="45720" rIns="91440" bIns="45720" rtlCol="0" anchor="b"/>
+          <a:lstStyle>
+            <a:lvl1pPr algn="l">
+              <a:defRPr sz="1200"/>
+            </a:lvl1pPr>
+          </a:lstStyle>
+          <a:p>
+            <a:endParaRPr lang="en-SG"/>
+          </a:p>
+        </p:txBody>
+      </p:sp>
+      <p:sp>
+        <p:nvSpPr>
+          <p:cNvPr id="7" name="Slide Number Placeholder 6"/>
+          <p:cNvSpPr>
+            <a:spLocks noGrp="1"/>
+          </p:cNvSpPr>
+          <p:nvPr>
+            <p:ph type="sldNum" sz="quarter" idx="5"/>
+          </p:nvPr>
+        </p:nvSpPr>
+        <p:spPr>
+          <a:xfrm>
+            <a:off x="3884613" y="8685213"/>
+            <a:ext cx="2971800" cy="458787"/>
+          </a:xfrm>
+          <a:prstGeom prst="rect">
+            <a:avLst/>
+          </a:prstGeom>
+        </p:spPr>
+        <p:txBody>
+          <a:bodyPr vert="horz" lIns="91440" tIns="45720" rIns="91440" bIns="45720" rtlCol="0" anchor="b"/>
+          <a:lstStyle>
+            <a:lvl1pPr algn="r">
+              <a:defRPr sz="1200"/>
+            </a:lvl1pPr>
+          </a:lstStyle>
+          <a:p>
+            <a:fld id="{82511444-1062-43B2-9DAF-F7E7A686B05D}" type="slidenum">
+              <a:rPr lang="en-SG" smtClean="0"/>
+              <a:t>‹#›</a:t>
+            </a:fld>
+            <a:endParaRPr lang="en-SG"/>
+          </a:p>
+        </p:txBody>
+      </p:sp>
+    </p:spTree>
+    <p:extLst>
+      <p:ext uri="{BB962C8B-B14F-4D97-AF65-F5344CB8AC3E}">
+        <p14:creationId xmlns:p14="http://schemas.microsoft.com/office/powerpoint/2010/main" val="1364502370"/>
+      </p:ext>
+    </p:extLst>
+  </p:cSld>
+  <p:clrMap bg1="lt1" tx1="dk1" bg2="lt2" tx2="dk2" accent1="accent1" accent2="accent2" accent3="accent3" accent4="accent4" accent5="accent5" accent6="accent6" hlink="hlink" folHlink="folHlink"/>
+  <p:notesStyle>
+    <a:lvl1pPr marL="0" algn="l" defTabSz="914400" rtl="0" eaLnBrk="1" latinLnBrk="0" hangingPunct="1">
+      <a:defRPr sz="1200" kern="1200">
+        <a:solidFill>
+          <a:schemeClr val="tx1"/>
+        </a:solidFill>
+        <a:latin typeface="+mn-lt"/>
+        <a:ea typeface="+mn-ea"/>
+        <a:cs typeface="+mn-cs"/>
+      </a:defRPr>
+    </a:lvl1pPr>
+    <a:lvl2pPr marL="457200" algn="l" defTabSz="914400" rtl="0" eaLnBrk="1" latinLnBrk="0" hangingPunct="1">
+      <a:defRPr sz="1200" kern="1200">
+        <a:solidFill>
+          <a:schemeClr val="tx1"/>
+        </a:solidFill>
+        <a:latin typeface="+mn-lt"/>
+        <a:ea typeface="+mn-ea"/>
+        <a:cs typeface="+mn-cs"/>
+      </a:defRPr>
+    </a:lvl2pPr>
+    <a:lvl3pPr marL="914400" algn="l" defTabSz="914400" rtl="0" eaLnBrk="1" latinLnBrk="0" hangingPunct="1">
+      <a:defRPr sz="1200" kern="1200">
+        <a:solidFill>
+          <a:schemeClr val="tx1"/>
+        </a:solidFill>
+        <a:latin typeface="+mn-lt"/>
+        <a:ea typeface="+mn-ea"/>
+        <a:cs typeface="+mn-cs"/>
+      </a:defRPr>
+    </a:lvl3pPr>
+    <a:lvl4pPr marL="1371600" algn="l" defTabSz="914400" rtl="0" eaLnBrk="1" latinLnBrk="0" hangingPunct="1">
+      <a:defRPr sz="1200" kern="1200">
+        <a:solidFill>
+          <a:schemeClr val="tx1"/>
+        </a:solidFill>
+        <a:latin typeface="+mn-lt"/>
+        <a:ea typeface="+mn-ea"/>
+        <a:cs typeface="+mn-cs"/>
+      </a:defRPr>
+    </a:lvl4pPr>
+    <a:lvl5pPr marL="1828800" algn="l" defTabSz="914400" rtl="0" eaLnBrk="1" latinLnBrk="0" hangingPunct="1">
+      <a:defRPr sz="1200" kern="1200">
+        <a:solidFill>
+          <a:schemeClr val="tx1"/>
+        </a:solidFill>
+        <a:latin typeface="+mn-lt"/>
+        <a:ea typeface="+mn-ea"/>
+        <a:cs typeface="+mn-cs"/>
+      </a:defRPr>
+    </a:lvl5pPr>
+    <a:lvl6pPr marL="2286000" algn="l" defTabSz="914400" rtl="0" eaLnBrk="1" latinLnBrk="0" hangingPunct="1">
+      <a:defRPr sz="1200" kern="1200">
+        <a:solidFill>
+          <a:schemeClr val="tx1"/>
+        </a:solidFill>
+        <a:latin typeface="+mn-lt"/>
+        <a:ea typeface="+mn-ea"/>
+        <a:cs typeface="+mn-cs"/>
+      </a:defRPr>
+    </a:lvl6pPr>
+    <a:lvl7pPr marL="2743200" algn="l" defTabSz="914400" rtl="0" eaLnBrk="1" latinLnBrk="0" hangingPunct="1">
+      <a:defRPr sz="1200" kern="1200">
+        <a:solidFill>
+          <a:schemeClr val="tx1"/>
+        </a:solidFill>
+        <a:latin typeface="+mn-lt"/>
+        <a:ea typeface="+mn-ea"/>
+        <a:cs typeface="+mn-cs"/>
+      </a:defRPr>
+    </a:lvl7pPr>
+    <a:lvl8pPr marL="3200400" algn="l" defTabSz="914400" rtl="0" eaLnBrk="1" latinLnBrk="0" hangingPunct="1">
+      <a:defRPr sz="1200" kern="1200">
+        <a:solidFill>
+          <a:schemeClr val="tx1"/>
+        </a:solidFill>
+        <a:latin typeface="+mn-lt"/>
+        <a:ea typeface="+mn-ea"/>
+        <a:cs typeface="+mn-cs"/>
+      </a:defRPr>
+    </a:lvl8pPr>
+    <a:lvl9pPr marL="3657600" algn="l" defTabSz="914400" rtl="0" eaLnBrk="1" latinLnBrk="0" hangingPunct="1">
+      <a:defRPr sz="1200" kern="1200">
+        <a:solidFill>
+          <a:schemeClr val="tx1"/>
+        </a:solidFill>
+        <a:latin typeface="+mn-lt"/>
+        <a:ea typeface="+mn-ea"/>
+        <a:cs typeface="+mn-cs"/>
+      </a:defRPr>
+    </a:lvl9pPr>
+  </p:notesStyle>
+</p:notesMaster>
+</file>
+
+<file path=ppt/notesSlides/notesSlide1.xml><?xml version="1.0" encoding="utf-8"?>
+<p:notes xmlns:a="http://schemas.openxmlformats.org/drawingml/2006/main" xmlns:r="http://schemas.openxmlformats.org/officeDocument/2006/relationships" xmlns:p="http://schemas.openxmlformats.org/presentationml/2006/main">
+  <p:cSld>
+    <p:spTree>
+      <p:nvGrpSpPr>
+        <p:cNvPr id="1" name=""/>
+        <p:cNvGrpSpPr/>
+        <p:nvPr/>
+      </p:nvGrpSpPr>
+      <p:grpSpPr>
+        <a:xfrm>
+          <a:off x="0" y="0"/>
+          <a:ext cx="0" cy="0"/>
+          <a:chOff x="0" y="0"/>
+          <a:chExt cx="0" cy="0"/>
+        </a:xfrm>
+      </p:grpSpPr>
+      <p:sp>
+        <p:nvSpPr>
+          <p:cNvPr id="2" name="Slide Image Placeholder 1"/>
+          <p:cNvSpPr>
+            <a:spLocks noGrp="1" noRot="1" noChangeAspect="1"/>
+          </p:cNvSpPr>
+          <p:nvPr>
+            <p:ph type="sldImg"/>
+          </p:nvPr>
+        </p:nvSpPr>
+        <p:spPr/>
+      </p:sp>
+      <p:sp>
+        <p:nvSpPr>
+          <p:cNvPr id="3" name="Notes Placeholder 2"/>
+          <p:cNvSpPr>
+            <a:spLocks noGrp="1"/>
+          </p:cNvSpPr>
+          <p:nvPr>
+            <p:ph type="body" idx="1"/>
+          </p:nvPr>
+        </p:nvSpPr>
+        <p:spPr/>
+        <p:txBody>
+          <a:bodyPr/>
+          <a:lstStyle/>
+          <a:p>
+            <a:endParaRPr lang="en-SG" dirty="0"/>
+          </a:p>
+        </p:txBody>
+      </p:sp>
+      <p:sp>
+        <p:nvSpPr>
+          <p:cNvPr id="4" name="Slide Number Placeholder 3"/>
+          <p:cNvSpPr>
+            <a:spLocks noGrp="1"/>
+          </p:cNvSpPr>
+          <p:nvPr>
+            <p:ph type="sldNum" sz="quarter" idx="5"/>
+          </p:nvPr>
+        </p:nvSpPr>
+        <p:spPr/>
+        <p:txBody>
+          <a:bodyPr/>
+          <a:lstStyle/>
+          <a:p>
+            <a:fld id="{82511444-1062-43B2-9DAF-F7E7A686B05D}" type="slidenum">
+              <a:rPr lang="en-SG" smtClean="0"/>
+              <a:t>2</a:t>
+            </a:fld>
+            <a:endParaRPr lang="en-SG"/>
+          </a:p>
+        </p:txBody>
+      </p:sp>
+    </p:spTree>
+    <p:extLst>
+      <p:ext uri="{BB962C8B-B14F-4D97-AF65-F5344CB8AC3E}">
+        <p14:creationId xmlns:p14="http://schemas.microsoft.com/office/powerpoint/2010/main" val="4049982978"/>
+      </p:ext>
+    </p:extLst>
+  </p:cSld>
+  <p:clrMapOvr>
+    <a:masterClrMapping/>
+  </p:clrMapOvr>
+</p:notes>
 </file>
 
 <file path=ppt/slideLayouts/slideLayout1.xml><?xml version="1.0" encoding="utf-8"?>
@@ -5135,6 +5580,2659 @@
     <p:extLst>
       <p:ext uri="{BB962C8B-B14F-4D97-AF65-F5344CB8AC3E}">
         <p14:creationId xmlns:p14="http://schemas.microsoft.com/office/powerpoint/2010/main" val="3128701734"/>
+      </p:ext>
+    </p:extLst>
+  </p:cSld>
+  <p:clrMapOvr>
+    <a:masterClrMapping/>
+  </p:clrMapOvr>
+</p:sld>
+</file>
+
+<file path=ppt/slides/slide2.xml><?xml version="1.0" encoding="utf-8"?>
+<p:sld xmlns:a="http://schemas.openxmlformats.org/drawingml/2006/main" xmlns:r="http://schemas.openxmlformats.org/officeDocument/2006/relationships" xmlns:p="http://schemas.openxmlformats.org/presentationml/2006/main">
+  <p:cSld>
+    <p:spTree>
+      <p:nvGrpSpPr>
+        <p:cNvPr id="1" name="">
+          <a:extLst>
+            <a:ext uri="{FF2B5EF4-FFF2-40B4-BE49-F238E27FC236}">
+              <a16:creationId xmlns:a16="http://schemas.microsoft.com/office/drawing/2014/main" id="{BDB9FEA1-99BE-8127-E94C-2D33D6D1E964}"/>
+            </a:ext>
+          </a:extLst>
+        </p:cNvPr>
+        <p:cNvGrpSpPr/>
+        <p:nvPr/>
+      </p:nvGrpSpPr>
+      <p:grpSpPr>
+        <a:xfrm>
+          <a:off x="0" y="0"/>
+          <a:ext cx="0" cy="0"/>
+          <a:chOff x="0" y="0"/>
+          <a:chExt cx="0" cy="0"/>
+        </a:xfrm>
+      </p:grpSpPr>
+      <p:sp>
+        <p:nvSpPr>
+          <p:cNvPr id="4" name="Rectangle 3">
+            <a:extLst>
+              <a:ext uri="{FF2B5EF4-FFF2-40B4-BE49-F238E27FC236}">
+                <a16:creationId xmlns:a16="http://schemas.microsoft.com/office/drawing/2014/main" id="{F82B59D2-DACA-A08C-7477-63D7F6B1DBF8}"/>
+              </a:ext>
+            </a:extLst>
+          </p:cNvPr>
+          <p:cNvSpPr/>
+          <p:nvPr/>
+        </p:nvSpPr>
+        <p:spPr>
+          <a:xfrm>
+            <a:off x="3543300" y="729663"/>
+            <a:ext cx="1798320" cy="716280"/>
+          </a:xfrm>
+          <a:prstGeom prst="rect">
+            <a:avLst/>
+          </a:prstGeom>
+          <a:solidFill>
+            <a:schemeClr val="accent6">
+              <a:lumMod val="60000"/>
+              <a:lumOff val="40000"/>
+            </a:schemeClr>
+          </a:solidFill>
+          <a:ln>
+            <a:noFill/>
+          </a:ln>
+        </p:spPr>
+        <p:style>
+          <a:lnRef idx="2">
+            <a:schemeClr val="accent1">
+              <a:shade val="15000"/>
+            </a:schemeClr>
+          </a:lnRef>
+          <a:fillRef idx="1">
+            <a:schemeClr val="accent1"/>
+          </a:fillRef>
+          <a:effectRef idx="0">
+            <a:schemeClr val="accent1"/>
+          </a:effectRef>
+          <a:fontRef idx="minor">
+            <a:schemeClr val="lt1"/>
+          </a:fontRef>
+        </p:style>
+        <p:txBody>
+          <a:bodyPr rtlCol="0" anchor="ctr"/>
+          <a:lstStyle/>
+          <a:p>
+            <a:pPr algn="ctr"/>
+            <a:r>
+              <a:rPr lang="en-SG" dirty="0">
+                <a:solidFill>
+                  <a:schemeClr val="tx1"/>
+                </a:solidFill>
+              </a:rPr>
+              <a:t>Pocket Geek</a:t>
+            </a:r>
+          </a:p>
+          <a:p>
+            <a:pPr algn="ctr"/>
+            <a:r>
+              <a:rPr lang="en-SG" dirty="0">
+                <a:solidFill>
+                  <a:schemeClr val="tx1"/>
+                </a:solidFill>
+              </a:rPr>
+              <a:t>system</a:t>
+            </a:r>
+          </a:p>
+        </p:txBody>
+      </p:sp>
+      <p:sp>
+        <p:nvSpPr>
+          <p:cNvPr id="10" name="Rectangle 9">
+            <a:extLst>
+              <a:ext uri="{FF2B5EF4-FFF2-40B4-BE49-F238E27FC236}">
+                <a16:creationId xmlns:a16="http://schemas.microsoft.com/office/drawing/2014/main" id="{1386E196-72CB-CC18-BA72-FE8ED7984491}"/>
+              </a:ext>
+            </a:extLst>
+          </p:cNvPr>
+          <p:cNvSpPr/>
+          <p:nvPr/>
+        </p:nvSpPr>
+        <p:spPr>
+          <a:xfrm>
+            <a:off x="4087263" y="2207868"/>
+            <a:ext cx="3223260" cy="1760218"/>
+          </a:xfrm>
+          <a:prstGeom prst="rect">
+            <a:avLst/>
+          </a:prstGeom>
+          <a:solidFill>
+            <a:schemeClr val="bg1"/>
+          </a:solidFill>
+        </p:spPr>
+        <p:style>
+          <a:lnRef idx="2">
+            <a:schemeClr val="accent1">
+              <a:shade val="15000"/>
+            </a:schemeClr>
+          </a:lnRef>
+          <a:fillRef idx="1">
+            <a:schemeClr val="accent1"/>
+          </a:fillRef>
+          <a:effectRef idx="0">
+            <a:schemeClr val="accent1"/>
+          </a:effectRef>
+          <a:fontRef idx="minor">
+            <a:schemeClr val="lt1"/>
+          </a:fontRef>
+        </p:style>
+        <p:txBody>
+          <a:bodyPr rtlCol="0" anchor="ctr"/>
+          <a:lstStyle/>
+          <a:p>
+            <a:pPr algn="ctr"/>
+            <a:endParaRPr lang="en-SG"/>
+          </a:p>
+        </p:txBody>
+      </p:sp>
+      <p:sp>
+        <p:nvSpPr>
+          <p:cNvPr id="11" name="TextBox 10">
+            <a:extLst>
+              <a:ext uri="{FF2B5EF4-FFF2-40B4-BE49-F238E27FC236}">
+                <a16:creationId xmlns:a16="http://schemas.microsoft.com/office/drawing/2014/main" id="{FF36C5EC-6FF9-8AA6-8A1D-57B860C4D6CE}"/>
+              </a:ext>
+            </a:extLst>
+          </p:cNvPr>
+          <p:cNvSpPr txBox="1"/>
+          <p:nvPr/>
+        </p:nvSpPr>
+        <p:spPr>
+          <a:xfrm>
+            <a:off x="4002571" y="4027259"/>
+            <a:ext cx="2770310" cy="369332"/>
+          </a:xfrm>
+          <a:prstGeom prst="rect">
+            <a:avLst/>
+          </a:prstGeom>
+          <a:noFill/>
+        </p:spPr>
+        <p:txBody>
+          <a:bodyPr wrap="none" rtlCol="0">
+            <a:spAutoFit/>
+          </a:bodyPr>
+          <a:lstStyle/>
+          <a:p>
+            <a:r>
+              <a:rPr lang="en-SG" dirty="0"/>
+              <a:t>Tier 1 Pocket Geek system</a:t>
+            </a:r>
+          </a:p>
+        </p:txBody>
+      </p:sp>
+      <p:sp>
+        <p:nvSpPr>
+          <p:cNvPr id="12" name="Rectangle 11">
+            <a:extLst>
+              <a:ext uri="{FF2B5EF4-FFF2-40B4-BE49-F238E27FC236}">
+                <a16:creationId xmlns:a16="http://schemas.microsoft.com/office/drawing/2014/main" id="{1B18C177-0FA2-F60F-F13F-327EC4E40EBB}"/>
+              </a:ext>
+            </a:extLst>
+          </p:cNvPr>
+          <p:cNvSpPr/>
+          <p:nvPr/>
+        </p:nvSpPr>
+        <p:spPr>
+          <a:xfrm>
+            <a:off x="4236720" y="2451707"/>
+            <a:ext cx="769620" cy="632461"/>
+          </a:xfrm>
+          <a:prstGeom prst="rect">
+            <a:avLst/>
+          </a:prstGeom>
+          <a:solidFill>
+            <a:schemeClr val="accent6">
+              <a:lumMod val="60000"/>
+              <a:lumOff val="40000"/>
+            </a:schemeClr>
+          </a:solidFill>
+          <a:ln>
+            <a:noFill/>
+          </a:ln>
+        </p:spPr>
+        <p:style>
+          <a:lnRef idx="2">
+            <a:schemeClr val="accent1">
+              <a:shade val="15000"/>
+            </a:schemeClr>
+          </a:lnRef>
+          <a:fillRef idx="1">
+            <a:schemeClr val="accent1"/>
+          </a:fillRef>
+          <a:effectRef idx="0">
+            <a:schemeClr val="accent1"/>
+          </a:effectRef>
+          <a:fontRef idx="minor">
+            <a:schemeClr val="lt1"/>
+          </a:fontRef>
+        </p:style>
+        <p:txBody>
+          <a:bodyPr rtlCol="0" anchor="ctr"/>
+          <a:lstStyle/>
+          <a:p>
+            <a:pPr algn="ctr"/>
+            <a:r>
+              <a:rPr lang="en-SG" sz="1600" dirty="0">
+                <a:solidFill>
+                  <a:schemeClr val="tx1"/>
+                </a:solidFill>
+              </a:rPr>
+              <a:t>VM</a:t>
+            </a:r>
+          </a:p>
+        </p:txBody>
+      </p:sp>
+      <p:sp>
+        <p:nvSpPr>
+          <p:cNvPr id="13" name="Rectangle 12">
+            <a:extLst>
+              <a:ext uri="{FF2B5EF4-FFF2-40B4-BE49-F238E27FC236}">
+                <a16:creationId xmlns:a16="http://schemas.microsoft.com/office/drawing/2014/main" id="{864A2A8B-D4EC-DA70-543E-D295F707C5C6}"/>
+              </a:ext>
+            </a:extLst>
+          </p:cNvPr>
+          <p:cNvSpPr/>
+          <p:nvPr/>
+        </p:nvSpPr>
+        <p:spPr>
+          <a:xfrm>
+            <a:off x="5121732" y="2451707"/>
+            <a:ext cx="1088567" cy="632461"/>
+          </a:xfrm>
+          <a:prstGeom prst="rect">
+            <a:avLst/>
+          </a:prstGeom>
+          <a:solidFill>
+            <a:schemeClr val="accent6">
+              <a:lumMod val="60000"/>
+              <a:lumOff val="40000"/>
+            </a:schemeClr>
+          </a:solidFill>
+          <a:ln>
+            <a:noFill/>
+          </a:ln>
+        </p:spPr>
+        <p:style>
+          <a:lnRef idx="2">
+            <a:schemeClr val="accent1">
+              <a:shade val="15000"/>
+            </a:schemeClr>
+          </a:lnRef>
+          <a:fillRef idx="1">
+            <a:schemeClr val="accent1"/>
+          </a:fillRef>
+          <a:effectRef idx="0">
+            <a:schemeClr val="accent1"/>
+          </a:effectRef>
+          <a:fontRef idx="minor">
+            <a:schemeClr val="lt1"/>
+          </a:fontRef>
+        </p:style>
+        <p:txBody>
+          <a:bodyPr rtlCol="0" anchor="ctr"/>
+          <a:lstStyle/>
+          <a:p>
+            <a:pPr algn="ctr"/>
+            <a:r>
+              <a:rPr lang="en-SG" sz="1600" dirty="0">
+                <a:solidFill>
+                  <a:schemeClr val="tx1"/>
+                </a:solidFill>
+              </a:rPr>
+              <a:t>Storage</a:t>
+            </a:r>
+          </a:p>
+        </p:txBody>
+      </p:sp>
+      <p:sp>
+        <p:nvSpPr>
+          <p:cNvPr id="14" name="Rectangle 13">
+            <a:extLst>
+              <a:ext uri="{FF2B5EF4-FFF2-40B4-BE49-F238E27FC236}">
+                <a16:creationId xmlns:a16="http://schemas.microsoft.com/office/drawing/2014/main" id="{39EA0D0B-5812-63C5-60CC-A1AC436B81F9}"/>
+              </a:ext>
+            </a:extLst>
+          </p:cNvPr>
+          <p:cNvSpPr/>
+          <p:nvPr/>
+        </p:nvSpPr>
+        <p:spPr>
+          <a:xfrm>
+            <a:off x="6325692" y="2451706"/>
+            <a:ext cx="769620" cy="632461"/>
+          </a:xfrm>
+          <a:prstGeom prst="rect">
+            <a:avLst/>
+          </a:prstGeom>
+          <a:solidFill>
+            <a:schemeClr val="accent6">
+              <a:lumMod val="60000"/>
+              <a:lumOff val="40000"/>
+            </a:schemeClr>
+          </a:solidFill>
+          <a:ln>
+            <a:noFill/>
+          </a:ln>
+        </p:spPr>
+        <p:style>
+          <a:lnRef idx="2">
+            <a:schemeClr val="accent1">
+              <a:shade val="15000"/>
+            </a:schemeClr>
+          </a:lnRef>
+          <a:fillRef idx="1">
+            <a:schemeClr val="accent1"/>
+          </a:fillRef>
+          <a:effectRef idx="0">
+            <a:schemeClr val="accent1"/>
+          </a:effectRef>
+          <a:fontRef idx="minor">
+            <a:schemeClr val="lt1"/>
+          </a:fontRef>
+        </p:style>
+        <p:txBody>
+          <a:bodyPr rtlCol="0" anchor="ctr"/>
+          <a:lstStyle/>
+          <a:p>
+            <a:pPr algn="ctr"/>
+            <a:r>
+              <a:rPr lang="en-SG" sz="1600" dirty="0">
+                <a:solidFill>
+                  <a:schemeClr val="tx1"/>
+                </a:solidFill>
+              </a:rPr>
+              <a:t>APIM</a:t>
+            </a:r>
+          </a:p>
+        </p:txBody>
+      </p:sp>
+      <p:sp>
+        <p:nvSpPr>
+          <p:cNvPr id="15" name="Rectangle 14">
+            <a:extLst>
+              <a:ext uri="{FF2B5EF4-FFF2-40B4-BE49-F238E27FC236}">
+                <a16:creationId xmlns:a16="http://schemas.microsoft.com/office/drawing/2014/main" id="{2D0E93D2-98F2-E4A6-1F44-2023C1E9B988}"/>
+              </a:ext>
+            </a:extLst>
+          </p:cNvPr>
+          <p:cNvSpPr/>
+          <p:nvPr/>
+        </p:nvSpPr>
+        <p:spPr>
+          <a:xfrm>
+            <a:off x="4260672" y="3160366"/>
+            <a:ext cx="989508" cy="632461"/>
+          </a:xfrm>
+          <a:prstGeom prst="rect">
+            <a:avLst/>
+          </a:prstGeom>
+          <a:solidFill>
+            <a:schemeClr val="accent6">
+              <a:lumMod val="60000"/>
+              <a:lumOff val="40000"/>
+            </a:schemeClr>
+          </a:solidFill>
+          <a:ln>
+            <a:noFill/>
+          </a:ln>
+        </p:spPr>
+        <p:style>
+          <a:lnRef idx="2">
+            <a:schemeClr val="accent1">
+              <a:shade val="15000"/>
+            </a:schemeClr>
+          </a:lnRef>
+          <a:fillRef idx="1">
+            <a:schemeClr val="accent1"/>
+          </a:fillRef>
+          <a:effectRef idx="0">
+            <a:schemeClr val="accent1"/>
+          </a:effectRef>
+          <a:fontRef idx="minor">
+            <a:schemeClr val="lt1"/>
+          </a:fontRef>
+        </p:style>
+        <p:txBody>
+          <a:bodyPr rtlCol="0" anchor="ctr"/>
+          <a:lstStyle/>
+          <a:p>
+            <a:pPr algn="ctr"/>
+            <a:r>
+              <a:rPr lang="en-SG" sz="1600" dirty="0">
+                <a:solidFill>
+                  <a:schemeClr val="tx1"/>
+                </a:solidFill>
+              </a:rPr>
+              <a:t>Firewall</a:t>
+            </a:r>
+          </a:p>
+        </p:txBody>
+      </p:sp>
+      <p:cxnSp>
+        <p:nvCxnSpPr>
+          <p:cNvPr id="2" name="Straight Connector 1">
+            <a:extLst>
+              <a:ext uri="{FF2B5EF4-FFF2-40B4-BE49-F238E27FC236}">
+                <a16:creationId xmlns:a16="http://schemas.microsoft.com/office/drawing/2014/main" id="{63B40672-4AFF-0459-4849-802E33E6C8C6}"/>
+              </a:ext>
+            </a:extLst>
+          </p:cNvPr>
+          <p:cNvCxnSpPr>
+            <a:cxnSpLocks/>
+          </p:cNvCxnSpPr>
+          <p:nvPr/>
+        </p:nvCxnSpPr>
+        <p:spPr>
+          <a:xfrm>
+            <a:off x="3215640" y="1787128"/>
+            <a:ext cx="6545580" cy="0"/>
+          </a:xfrm>
+          <a:prstGeom prst="line">
+            <a:avLst/>
+          </a:prstGeom>
+        </p:spPr>
+        <p:style>
+          <a:lnRef idx="2">
+            <a:schemeClr val="accent1"/>
+          </a:lnRef>
+          <a:fillRef idx="0">
+            <a:schemeClr val="accent1"/>
+          </a:fillRef>
+          <a:effectRef idx="1">
+            <a:schemeClr val="accent1"/>
+          </a:effectRef>
+          <a:fontRef idx="minor">
+            <a:schemeClr val="tx1"/>
+          </a:fontRef>
+        </p:style>
+      </p:cxnSp>
+      <p:sp>
+        <p:nvSpPr>
+          <p:cNvPr id="3" name="TextBox 2">
+            <a:extLst>
+              <a:ext uri="{FF2B5EF4-FFF2-40B4-BE49-F238E27FC236}">
+                <a16:creationId xmlns:a16="http://schemas.microsoft.com/office/drawing/2014/main" id="{C819EBE4-3917-7EEE-08BA-497998943DB2}"/>
+              </a:ext>
+            </a:extLst>
+          </p:cNvPr>
+          <p:cNvSpPr txBox="1"/>
+          <p:nvPr/>
+        </p:nvSpPr>
+        <p:spPr>
+          <a:xfrm>
+            <a:off x="1788727" y="1366389"/>
+            <a:ext cx="1456553" cy="553998"/>
+          </a:xfrm>
+          <a:prstGeom prst="rect">
+            <a:avLst/>
+          </a:prstGeom>
+          <a:noFill/>
+        </p:spPr>
+        <p:txBody>
+          <a:bodyPr wrap="none" rtlCol="0">
+            <a:spAutoFit/>
+          </a:bodyPr>
+          <a:lstStyle/>
+          <a:p>
+            <a:pPr algn="ctr"/>
+            <a:r>
+              <a:rPr lang="en-SG" dirty="0"/>
+              <a:t>Tier 0</a:t>
+            </a:r>
+          </a:p>
+          <a:p>
+            <a:pPr algn="ctr"/>
+            <a:r>
+              <a:rPr lang="en-SG" sz="1200" dirty="0"/>
+              <a:t>(summary of Tier 1)</a:t>
+            </a:r>
+          </a:p>
+        </p:txBody>
+      </p:sp>
+      <p:sp>
+        <p:nvSpPr>
+          <p:cNvPr id="7" name="Rectangle 6">
+            <a:extLst>
+              <a:ext uri="{FF2B5EF4-FFF2-40B4-BE49-F238E27FC236}">
+                <a16:creationId xmlns:a16="http://schemas.microsoft.com/office/drawing/2014/main" id="{C18371C9-BF58-BDDC-C7D3-B09512FF9A9B}"/>
+              </a:ext>
+            </a:extLst>
+          </p:cNvPr>
+          <p:cNvSpPr/>
+          <p:nvPr/>
+        </p:nvSpPr>
+        <p:spPr>
+          <a:xfrm>
+            <a:off x="5545626" y="733711"/>
+            <a:ext cx="1798320" cy="716280"/>
+          </a:xfrm>
+          <a:prstGeom prst="rect">
+            <a:avLst/>
+          </a:prstGeom>
+          <a:solidFill>
+            <a:srgbClr val="FFC000"/>
+          </a:solidFill>
+          <a:ln>
+            <a:noFill/>
+          </a:ln>
+        </p:spPr>
+        <p:style>
+          <a:lnRef idx="2">
+            <a:schemeClr val="accent1">
+              <a:shade val="15000"/>
+            </a:schemeClr>
+          </a:lnRef>
+          <a:fillRef idx="1">
+            <a:schemeClr val="accent1"/>
+          </a:fillRef>
+          <a:effectRef idx="0">
+            <a:schemeClr val="accent1"/>
+          </a:effectRef>
+          <a:fontRef idx="minor">
+            <a:schemeClr val="lt1"/>
+          </a:fontRef>
+        </p:style>
+        <p:txBody>
+          <a:bodyPr rtlCol="0" anchor="ctr"/>
+          <a:lstStyle/>
+          <a:p>
+            <a:pPr algn="ctr"/>
+            <a:r>
+              <a:rPr lang="en-SG" dirty="0">
+                <a:solidFill>
+                  <a:schemeClr val="tx1"/>
+                </a:solidFill>
+              </a:rPr>
+              <a:t>Cloud Crafty</a:t>
+            </a:r>
+          </a:p>
+          <a:p>
+            <a:pPr algn="ctr"/>
+            <a:r>
+              <a:rPr lang="en-SG" dirty="0">
+                <a:solidFill>
+                  <a:schemeClr val="tx1"/>
+                </a:solidFill>
+              </a:rPr>
+              <a:t>system</a:t>
+            </a:r>
+          </a:p>
+        </p:txBody>
+      </p:sp>
+      <p:sp>
+        <p:nvSpPr>
+          <p:cNvPr id="33" name="Rectangle 32">
+            <a:extLst>
+              <a:ext uri="{FF2B5EF4-FFF2-40B4-BE49-F238E27FC236}">
+                <a16:creationId xmlns:a16="http://schemas.microsoft.com/office/drawing/2014/main" id="{9C7710B9-C948-C83B-7D2D-6D8AF4001093}"/>
+              </a:ext>
+            </a:extLst>
+          </p:cNvPr>
+          <p:cNvSpPr/>
+          <p:nvPr/>
+        </p:nvSpPr>
+        <p:spPr>
+          <a:xfrm>
+            <a:off x="7547952" y="721186"/>
+            <a:ext cx="1798320" cy="716280"/>
+          </a:xfrm>
+          <a:prstGeom prst="rect">
+            <a:avLst/>
+          </a:prstGeom>
+          <a:solidFill>
+            <a:srgbClr val="FF0000"/>
+          </a:solidFill>
+          <a:ln>
+            <a:noFill/>
+          </a:ln>
+        </p:spPr>
+        <p:style>
+          <a:lnRef idx="2">
+            <a:schemeClr val="accent1">
+              <a:shade val="15000"/>
+            </a:schemeClr>
+          </a:lnRef>
+          <a:fillRef idx="1">
+            <a:schemeClr val="accent1"/>
+          </a:fillRef>
+          <a:effectRef idx="0">
+            <a:schemeClr val="accent1"/>
+          </a:effectRef>
+          <a:fontRef idx="minor">
+            <a:schemeClr val="lt1"/>
+          </a:fontRef>
+        </p:style>
+        <p:txBody>
+          <a:bodyPr rtlCol="0" anchor="ctr"/>
+          <a:lstStyle/>
+          <a:p>
+            <a:pPr algn="ctr"/>
+            <a:r>
+              <a:rPr lang="en-SG" b="0" i="0" dirty="0">
+                <a:solidFill>
+                  <a:schemeClr val="bg1"/>
+                </a:solidFill>
+                <a:effectLst/>
+                <a:latin typeface="Arial" panose="020B0604020202020204" pitchFamily="34" charset="0"/>
+              </a:rPr>
+              <a:t> Enigma Hub</a:t>
+            </a:r>
+          </a:p>
+          <a:p>
+            <a:pPr algn="ctr"/>
+            <a:r>
+              <a:rPr lang="en-SG" dirty="0">
+                <a:solidFill>
+                  <a:schemeClr val="bg1"/>
+                </a:solidFill>
+                <a:latin typeface="Arial" panose="020B0604020202020204" pitchFamily="34" charset="0"/>
+              </a:rPr>
+              <a:t>system</a:t>
+            </a:r>
+            <a:r>
+              <a:rPr lang="en-SG" b="0" i="0" dirty="0">
+                <a:solidFill>
+                  <a:schemeClr val="bg1"/>
+                </a:solidFill>
+                <a:effectLst/>
+                <a:latin typeface="Arial" panose="020B0604020202020204" pitchFamily="34" charset="0"/>
+              </a:rPr>
+              <a:t> </a:t>
+            </a:r>
+            <a:endParaRPr lang="en-SG" dirty="0">
+              <a:solidFill>
+                <a:schemeClr val="bg1"/>
+              </a:solidFill>
+            </a:endParaRPr>
+          </a:p>
+        </p:txBody>
+      </p:sp>
+      <p:cxnSp>
+        <p:nvCxnSpPr>
+          <p:cNvPr id="37" name="Connector: Elbow 36">
+            <a:extLst>
+              <a:ext uri="{FF2B5EF4-FFF2-40B4-BE49-F238E27FC236}">
+                <a16:creationId xmlns:a16="http://schemas.microsoft.com/office/drawing/2014/main" id="{42A2FC8C-6ECF-6948-A179-929224050868}"/>
+              </a:ext>
+            </a:extLst>
+          </p:cNvPr>
+          <p:cNvCxnSpPr>
+            <a:cxnSpLocks/>
+            <a:stCxn id="10" idx="1"/>
+            <a:endCxn id="4" idx="1"/>
+          </p:cNvCxnSpPr>
+          <p:nvPr/>
+        </p:nvCxnSpPr>
+        <p:spPr>
+          <a:xfrm rot="10800000">
+            <a:off x="3543301" y="1087803"/>
+            <a:ext cx="543963" cy="2000174"/>
+          </a:xfrm>
+          <a:prstGeom prst="bentConnector3">
+            <a:avLst>
+              <a:gd name="adj1" fmla="val 142025"/>
+            </a:avLst>
+          </a:prstGeom>
+          <a:ln>
+            <a:solidFill>
+              <a:schemeClr val="accent6">
+                <a:lumMod val="75000"/>
+              </a:schemeClr>
+            </a:solidFill>
+            <a:prstDash val="sysDash"/>
+            <a:tailEnd type="triangle"/>
+          </a:ln>
+        </p:spPr>
+        <p:style>
+          <a:lnRef idx="2">
+            <a:schemeClr val="accent1"/>
+          </a:lnRef>
+          <a:fillRef idx="0">
+            <a:schemeClr val="accent1"/>
+          </a:fillRef>
+          <a:effectRef idx="1">
+            <a:schemeClr val="accent1"/>
+          </a:effectRef>
+          <a:fontRef idx="minor">
+            <a:schemeClr val="tx1"/>
+          </a:fontRef>
+        </p:style>
+      </p:cxnSp>
+    </p:spTree>
+    <p:extLst>
+      <p:ext uri="{BB962C8B-B14F-4D97-AF65-F5344CB8AC3E}">
+        <p14:creationId xmlns:p14="http://schemas.microsoft.com/office/powerpoint/2010/main" val="3222823561"/>
+      </p:ext>
+    </p:extLst>
+  </p:cSld>
+  <p:clrMapOvr>
+    <a:masterClrMapping/>
+  </p:clrMapOvr>
+</p:sld>
+</file>
+
+<file path=ppt/slides/slide3.xml><?xml version="1.0" encoding="utf-8"?>
+<p:sld xmlns:a="http://schemas.openxmlformats.org/drawingml/2006/main" xmlns:r="http://schemas.openxmlformats.org/officeDocument/2006/relationships" xmlns:p="http://schemas.openxmlformats.org/presentationml/2006/main">
+  <p:cSld>
+    <p:spTree>
+      <p:nvGrpSpPr>
+        <p:cNvPr id="1" name="">
+          <a:extLst>
+            <a:ext uri="{FF2B5EF4-FFF2-40B4-BE49-F238E27FC236}">
+              <a16:creationId xmlns:a16="http://schemas.microsoft.com/office/drawing/2014/main" id="{6078D72C-C326-12BB-5D02-9845073B58F5}"/>
+            </a:ext>
+          </a:extLst>
+        </p:cNvPr>
+        <p:cNvGrpSpPr/>
+        <p:nvPr/>
+      </p:nvGrpSpPr>
+      <p:grpSpPr>
+        <a:xfrm>
+          <a:off x="0" y="0"/>
+          <a:ext cx="0" cy="0"/>
+          <a:chOff x="0" y="0"/>
+          <a:chExt cx="0" cy="0"/>
+        </a:xfrm>
+      </p:grpSpPr>
+      <p:sp>
+        <p:nvSpPr>
+          <p:cNvPr id="17" name="TextBox 16">
+            <a:extLst>
+              <a:ext uri="{FF2B5EF4-FFF2-40B4-BE49-F238E27FC236}">
+                <a16:creationId xmlns:a16="http://schemas.microsoft.com/office/drawing/2014/main" id="{49339F58-5E4F-DE90-9BD4-F4BD1729B668}"/>
+              </a:ext>
+            </a:extLst>
+          </p:cNvPr>
+          <p:cNvSpPr txBox="1"/>
+          <p:nvPr/>
+        </p:nvSpPr>
+        <p:spPr>
+          <a:xfrm>
+            <a:off x="9930740" y="7732511"/>
+            <a:ext cx="2019399" cy="369332"/>
+          </a:xfrm>
+          <a:prstGeom prst="rect">
+            <a:avLst/>
+          </a:prstGeom>
+          <a:noFill/>
+        </p:spPr>
+        <p:txBody>
+          <a:bodyPr wrap="none" rtlCol="0">
+            <a:spAutoFit/>
+          </a:bodyPr>
+          <a:lstStyle/>
+          <a:p>
+            <a:r>
+              <a:rPr lang="en-SG" dirty="0"/>
+              <a:t>Tier 1 Cloud Crafty</a:t>
+            </a:r>
+          </a:p>
+        </p:txBody>
+      </p:sp>
+      <p:sp>
+        <p:nvSpPr>
+          <p:cNvPr id="35" name="Rectangle 34">
+            <a:extLst>
+              <a:ext uri="{FF2B5EF4-FFF2-40B4-BE49-F238E27FC236}">
+                <a16:creationId xmlns:a16="http://schemas.microsoft.com/office/drawing/2014/main" id="{6132FA30-3331-7869-8764-A9C16AFF6C16}"/>
+              </a:ext>
+            </a:extLst>
+          </p:cNvPr>
+          <p:cNvSpPr/>
+          <p:nvPr/>
+        </p:nvSpPr>
+        <p:spPr>
+          <a:xfrm>
+            <a:off x="3543300" y="729663"/>
+            <a:ext cx="1798320" cy="716280"/>
+          </a:xfrm>
+          <a:prstGeom prst="rect">
+            <a:avLst/>
+          </a:prstGeom>
+          <a:solidFill>
+            <a:schemeClr val="accent6">
+              <a:lumMod val="60000"/>
+              <a:lumOff val="40000"/>
+            </a:schemeClr>
+          </a:solidFill>
+          <a:ln>
+            <a:noFill/>
+          </a:ln>
+        </p:spPr>
+        <p:style>
+          <a:lnRef idx="2">
+            <a:schemeClr val="accent1">
+              <a:shade val="15000"/>
+            </a:schemeClr>
+          </a:lnRef>
+          <a:fillRef idx="1">
+            <a:schemeClr val="accent1"/>
+          </a:fillRef>
+          <a:effectRef idx="0">
+            <a:schemeClr val="accent1"/>
+          </a:effectRef>
+          <a:fontRef idx="minor">
+            <a:schemeClr val="lt1"/>
+          </a:fontRef>
+        </p:style>
+        <p:txBody>
+          <a:bodyPr rtlCol="0" anchor="ctr"/>
+          <a:lstStyle/>
+          <a:p>
+            <a:pPr algn="ctr"/>
+            <a:r>
+              <a:rPr lang="en-SG" dirty="0">
+                <a:solidFill>
+                  <a:schemeClr val="tx1"/>
+                </a:solidFill>
+              </a:rPr>
+              <a:t>Pocket Geek</a:t>
+            </a:r>
+          </a:p>
+          <a:p>
+            <a:pPr algn="ctr"/>
+            <a:r>
+              <a:rPr lang="en-SG" dirty="0">
+                <a:solidFill>
+                  <a:schemeClr val="tx1"/>
+                </a:solidFill>
+              </a:rPr>
+              <a:t>system</a:t>
+            </a:r>
+          </a:p>
+        </p:txBody>
+      </p:sp>
+      <p:cxnSp>
+        <p:nvCxnSpPr>
+          <p:cNvPr id="44" name="Straight Connector 43">
+            <a:extLst>
+              <a:ext uri="{FF2B5EF4-FFF2-40B4-BE49-F238E27FC236}">
+                <a16:creationId xmlns:a16="http://schemas.microsoft.com/office/drawing/2014/main" id="{45FBB2D2-00EE-A1DF-11D4-BD1464DC72A7}"/>
+              </a:ext>
+            </a:extLst>
+          </p:cNvPr>
+          <p:cNvCxnSpPr>
+            <a:cxnSpLocks/>
+          </p:cNvCxnSpPr>
+          <p:nvPr/>
+        </p:nvCxnSpPr>
+        <p:spPr>
+          <a:xfrm>
+            <a:off x="3215640" y="1787128"/>
+            <a:ext cx="6545580" cy="0"/>
+          </a:xfrm>
+          <a:prstGeom prst="line">
+            <a:avLst/>
+          </a:prstGeom>
+        </p:spPr>
+        <p:style>
+          <a:lnRef idx="2">
+            <a:schemeClr val="accent1"/>
+          </a:lnRef>
+          <a:fillRef idx="0">
+            <a:schemeClr val="accent1"/>
+          </a:fillRef>
+          <a:effectRef idx="1">
+            <a:schemeClr val="accent1"/>
+          </a:effectRef>
+          <a:fontRef idx="minor">
+            <a:schemeClr val="tx1"/>
+          </a:fontRef>
+        </p:style>
+      </p:cxnSp>
+      <p:sp>
+        <p:nvSpPr>
+          <p:cNvPr id="46" name="TextBox 45">
+            <a:extLst>
+              <a:ext uri="{FF2B5EF4-FFF2-40B4-BE49-F238E27FC236}">
+                <a16:creationId xmlns:a16="http://schemas.microsoft.com/office/drawing/2014/main" id="{F81072F1-65FB-2FFE-54CB-1FF9BAA10695}"/>
+              </a:ext>
+            </a:extLst>
+          </p:cNvPr>
+          <p:cNvSpPr txBox="1"/>
+          <p:nvPr/>
+        </p:nvSpPr>
+        <p:spPr>
+          <a:xfrm>
+            <a:off x="1788727" y="1366389"/>
+            <a:ext cx="1456553" cy="553998"/>
+          </a:xfrm>
+          <a:prstGeom prst="rect">
+            <a:avLst/>
+          </a:prstGeom>
+          <a:noFill/>
+        </p:spPr>
+        <p:txBody>
+          <a:bodyPr wrap="none" rtlCol="0">
+            <a:spAutoFit/>
+          </a:bodyPr>
+          <a:lstStyle/>
+          <a:p>
+            <a:pPr algn="ctr"/>
+            <a:r>
+              <a:rPr lang="en-SG" dirty="0"/>
+              <a:t>Tier 0</a:t>
+            </a:r>
+          </a:p>
+          <a:p>
+            <a:pPr algn="ctr"/>
+            <a:r>
+              <a:rPr lang="en-SG" sz="1200" dirty="0"/>
+              <a:t>(summary of Tier 1)</a:t>
+            </a:r>
+          </a:p>
+        </p:txBody>
+      </p:sp>
+      <p:sp>
+        <p:nvSpPr>
+          <p:cNvPr id="47" name="Rectangle 46">
+            <a:extLst>
+              <a:ext uri="{FF2B5EF4-FFF2-40B4-BE49-F238E27FC236}">
+                <a16:creationId xmlns:a16="http://schemas.microsoft.com/office/drawing/2014/main" id="{24E93EF7-FF7A-1C2B-82A1-2ED3C106C600}"/>
+              </a:ext>
+            </a:extLst>
+          </p:cNvPr>
+          <p:cNvSpPr/>
+          <p:nvPr/>
+        </p:nvSpPr>
+        <p:spPr>
+          <a:xfrm>
+            <a:off x="5545626" y="733711"/>
+            <a:ext cx="1798320" cy="716280"/>
+          </a:xfrm>
+          <a:prstGeom prst="rect">
+            <a:avLst/>
+          </a:prstGeom>
+          <a:solidFill>
+            <a:srgbClr val="FFC000"/>
+          </a:solidFill>
+          <a:ln>
+            <a:noFill/>
+          </a:ln>
+        </p:spPr>
+        <p:style>
+          <a:lnRef idx="2">
+            <a:schemeClr val="accent1">
+              <a:shade val="15000"/>
+            </a:schemeClr>
+          </a:lnRef>
+          <a:fillRef idx="1">
+            <a:schemeClr val="accent1"/>
+          </a:fillRef>
+          <a:effectRef idx="0">
+            <a:schemeClr val="accent1"/>
+          </a:effectRef>
+          <a:fontRef idx="minor">
+            <a:schemeClr val="lt1"/>
+          </a:fontRef>
+        </p:style>
+        <p:txBody>
+          <a:bodyPr rtlCol="0" anchor="ctr"/>
+          <a:lstStyle/>
+          <a:p>
+            <a:pPr algn="ctr"/>
+            <a:r>
+              <a:rPr lang="en-SG" dirty="0">
+                <a:solidFill>
+                  <a:schemeClr val="tx1"/>
+                </a:solidFill>
+              </a:rPr>
+              <a:t>Cloud Crafty</a:t>
+            </a:r>
+          </a:p>
+          <a:p>
+            <a:pPr algn="ctr"/>
+            <a:r>
+              <a:rPr lang="en-SG" dirty="0">
+                <a:solidFill>
+                  <a:schemeClr val="tx1"/>
+                </a:solidFill>
+              </a:rPr>
+              <a:t>system</a:t>
+            </a:r>
+          </a:p>
+        </p:txBody>
+      </p:sp>
+      <p:sp>
+        <p:nvSpPr>
+          <p:cNvPr id="48" name="Rectangle 47">
+            <a:extLst>
+              <a:ext uri="{FF2B5EF4-FFF2-40B4-BE49-F238E27FC236}">
+                <a16:creationId xmlns:a16="http://schemas.microsoft.com/office/drawing/2014/main" id="{AC41C5F2-A216-A345-6DCF-1597C1B3345A}"/>
+              </a:ext>
+            </a:extLst>
+          </p:cNvPr>
+          <p:cNvSpPr/>
+          <p:nvPr/>
+        </p:nvSpPr>
+        <p:spPr>
+          <a:xfrm>
+            <a:off x="7547952" y="721186"/>
+            <a:ext cx="1798320" cy="716280"/>
+          </a:xfrm>
+          <a:prstGeom prst="rect">
+            <a:avLst/>
+          </a:prstGeom>
+          <a:solidFill>
+            <a:srgbClr val="FF0000"/>
+          </a:solidFill>
+          <a:ln>
+            <a:noFill/>
+          </a:ln>
+        </p:spPr>
+        <p:style>
+          <a:lnRef idx="2">
+            <a:schemeClr val="accent1">
+              <a:shade val="15000"/>
+            </a:schemeClr>
+          </a:lnRef>
+          <a:fillRef idx="1">
+            <a:schemeClr val="accent1"/>
+          </a:fillRef>
+          <a:effectRef idx="0">
+            <a:schemeClr val="accent1"/>
+          </a:effectRef>
+          <a:fontRef idx="minor">
+            <a:schemeClr val="lt1"/>
+          </a:fontRef>
+        </p:style>
+        <p:txBody>
+          <a:bodyPr rtlCol="0" anchor="ctr"/>
+          <a:lstStyle/>
+          <a:p>
+            <a:pPr algn="ctr"/>
+            <a:r>
+              <a:rPr lang="en-SG" b="0" i="0" dirty="0">
+                <a:solidFill>
+                  <a:schemeClr val="bg1"/>
+                </a:solidFill>
+                <a:effectLst/>
+                <a:latin typeface="Arial" panose="020B0604020202020204" pitchFamily="34" charset="0"/>
+              </a:rPr>
+              <a:t> Enigma Hub</a:t>
+            </a:r>
+          </a:p>
+          <a:p>
+            <a:pPr algn="ctr"/>
+            <a:r>
+              <a:rPr lang="en-SG" dirty="0">
+                <a:solidFill>
+                  <a:schemeClr val="bg1"/>
+                </a:solidFill>
+                <a:latin typeface="Arial" panose="020B0604020202020204" pitchFamily="34" charset="0"/>
+              </a:rPr>
+              <a:t>system</a:t>
+            </a:r>
+            <a:r>
+              <a:rPr lang="en-SG" b="0" i="0" dirty="0">
+                <a:solidFill>
+                  <a:schemeClr val="bg1"/>
+                </a:solidFill>
+                <a:effectLst/>
+                <a:latin typeface="Arial" panose="020B0604020202020204" pitchFamily="34" charset="0"/>
+              </a:rPr>
+              <a:t> </a:t>
+            </a:r>
+            <a:endParaRPr lang="en-SG" dirty="0">
+              <a:solidFill>
+                <a:schemeClr val="bg1"/>
+              </a:solidFill>
+            </a:endParaRPr>
+          </a:p>
+        </p:txBody>
+      </p:sp>
+      <p:sp>
+        <p:nvSpPr>
+          <p:cNvPr id="50" name="Rectangle 49">
+            <a:extLst>
+              <a:ext uri="{FF2B5EF4-FFF2-40B4-BE49-F238E27FC236}">
+                <a16:creationId xmlns:a16="http://schemas.microsoft.com/office/drawing/2014/main" id="{EB1EF4F8-C25B-B2CD-9B71-FD4D71DC7FA8}"/>
+              </a:ext>
+            </a:extLst>
+          </p:cNvPr>
+          <p:cNvSpPr/>
+          <p:nvPr/>
+        </p:nvSpPr>
+        <p:spPr>
+          <a:xfrm>
+            <a:off x="4527674" y="2263140"/>
+            <a:ext cx="3371192" cy="1790699"/>
+          </a:xfrm>
+          <a:prstGeom prst="rect">
+            <a:avLst/>
+          </a:prstGeom>
+          <a:solidFill>
+            <a:schemeClr val="bg1"/>
+          </a:solidFill>
+        </p:spPr>
+        <p:style>
+          <a:lnRef idx="2">
+            <a:schemeClr val="accent1">
+              <a:shade val="15000"/>
+            </a:schemeClr>
+          </a:lnRef>
+          <a:fillRef idx="1">
+            <a:schemeClr val="accent1"/>
+          </a:fillRef>
+          <a:effectRef idx="0">
+            <a:schemeClr val="accent1"/>
+          </a:effectRef>
+          <a:fontRef idx="minor">
+            <a:schemeClr val="lt1"/>
+          </a:fontRef>
+        </p:style>
+        <p:txBody>
+          <a:bodyPr rtlCol="0" anchor="ctr"/>
+          <a:lstStyle/>
+          <a:p>
+            <a:pPr algn="ctr"/>
+            <a:endParaRPr lang="en-SG"/>
+          </a:p>
+        </p:txBody>
+      </p:sp>
+      <p:sp>
+        <p:nvSpPr>
+          <p:cNvPr id="51" name="Rectangle 50">
+            <a:extLst>
+              <a:ext uri="{FF2B5EF4-FFF2-40B4-BE49-F238E27FC236}">
+                <a16:creationId xmlns:a16="http://schemas.microsoft.com/office/drawing/2014/main" id="{58B6A07A-9AA8-AF7A-A8E2-3AC9DEECB296}"/>
+              </a:ext>
+            </a:extLst>
+          </p:cNvPr>
+          <p:cNvSpPr/>
+          <p:nvPr/>
+        </p:nvSpPr>
+        <p:spPr>
+          <a:xfrm>
+            <a:off x="4687694" y="2506979"/>
+            <a:ext cx="769620" cy="632461"/>
+          </a:xfrm>
+          <a:prstGeom prst="rect">
+            <a:avLst/>
+          </a:prstGeom>
+          <a:solidFill>
+            <a:schemeClr val="accent6">
+              <a:lumMod val="60000"/>
+              <a:lumOff val="40000"/>
+            </a:schemeClr>
+          </a:solidFill>
+          <a:ln>
+            <a:noFill/>
+          </a:ln>
+        </p:spPr>
+        <p:style>
+          <a:lnRef idx="2">
+            <a:schemeClr val="accent1">
+              <a:shade val="15000"/>
+            </a:schemeClr>
+          </a:lnRef>
+          <a:fillRef idx="1">
+            <a:schemeClr val="accent1"/>
+          </a:fillRef>
+          <a:effectRef idx="0">
+            <a:schemeClr val="accent1"/>
+          </a:effectRef>
+          <a:fontRef idx="minor">
+            <a:schemeClr val="lt1"/>
+          </a:fontRef>
+        </p:style>
+        <p:txBody>
+          <a:bodyPr rtlCol="0" anchor="ctr"/>
+          <a:lstStyle/>
+          <a:p>
+            <a:pPr algn="ctr"/>
+            <a:r>
+              <a:rPr lang="en-SG" sz="1600" dirty="0">
+                <a:solidFill>
+                  <a:schemeClr val="tx1"/>
+                </a:solidFill>
+              </a:rPr>
+              <a:t>VM 1</a:t>
+            </a:r>
+          </a:p>
+        </p:txBody>
+      </p:sp>
+      <p:sp>
+        <p:nvSpPr>
+          <p:cNvPr id="52" name="Rectangle 51">
+            <a:extLst>
+              <a:ext uri="{FF2B5EF4-FFF2-40B4-BE49-F238E27FC236}">
+                <a16:creationId xmlns:a16="http://schemas.microsoft.com/office/drawing/2014/main" id="{774B5FC0-A32C-513B-43DB-E00C2233623C}"/>
+              </a:ext>
+            </a:extLst>
+          </p:cNvPr>
+          <p:cNvSpPr/>
+          <p:nvPr/>
+        </p:nvSpPr>
+        <p:spPr>
+          <a:xfrm>
+            <a:off x="5801866" y="3211829"/>
+            <a:ext cx="1088567" cy="632461"/>
+          </a:xfrm>
+          <a:prstGeom prst="rect">
+            <a:avLst/>
+          </a:prstGeom>
+          <a:solidFill>
+            <a:schemeClr val="accent6">
+              <a:lumMod val="60000"/>
+              <a:lumOff val="40000"/>
+            </a:schemeClr>
+          </a:solidFill>
+          <a:ln>
+            <a:noFill/>
+          </a:ln>
+        </p:spPr>
+        <p:style>
+          <a:lnRef idx="2">
+            <a:schemeClr val="accent1">
+              <a:shade val="15000"/>
+            </a:schemeClr>
+          </a:lnRef>
+          <a:fillRef idx="1">
+            <a:schemeClr val="accent1"/>
+          </a:fillRef>
+          <a:effectRef idx="0">
+            <a:schemeClr val="accent1"/>
+          </a:effectRef>
+          <a:fontRef idx="minor">
+            <a:schemeClr val="lt1"/>
+          </a:fontRef>
+        </p:style>
+        <p:txBody>
+          <a:bodyPr rtlCol="0" anchor="ctr"/>
+          <a:lstStyle/>
+          <a:p>
+            <a:pPr algn="ctr"/>
+            <a:r>
+              <a:rPr lang="en-SG" sz="1600" dirty="0">
+                <a:solidFill>
+                  <a:schemeClr val="tx1"/>
+                </a:solidFill>
+              </a:rPr>
+              <a:t>Storage</a:t>
+            </a:r>
+          </a:p>
+        </p:txBody>
+      </p:sp>
+      <p:sp>
+        <p:nvSpPr>
+          <p:cNvPr id="53" name="Rectangle 52">
+            <a:extLst>
+              <a:ext uri="{FF2B5EF4-FFF2-40B4-BE49-F238E27FC236}">
+                <a16:creationId xmlns:a16="http://schemas.microsoft.com/office/drawing/2014/main" id="{48CAFC1D-33A5-74A4-1B2F-5439283AF38C}"/>
+              </a:ext>
+            </a:extLst>
+          </p:cNvPr>
+          <p:cNvSpPr/>
+          <p:nvPr/>
+        </p:nvSpPr>
+        <p:spPr>
+          <a:xfrm>
+            <a:off x="6975346" y="3211828"/>
+            <a:ext cx="769620" cy="632461"/>
+          </a:xfrm>
+          <a:prstGeom prst="rect">
+            <a:avLst/>
+          </a:prstGeom>
+          <a:solidFill>
+            <a:schemeClr val="accent6">
+              <a:lumMod val="60000"/>
+              <a:lumOff val="40000"/>
+            </a:schemeClr>
+          </a:solidFill>
+          <a:ln>
+            <a:noFill/>
+          </a:ln>
+        </p:spPr>
+        <p:style>
+          <a:lnRef idx="2">
+            <a:schemeClr val="accent1">
+              <a:shade val="15000"/>
+            </a:schemeClr>
+          </a:lnRef>
+          <a:fillRef idx="1">
+            <a:schemeClr val="accent1"/>
+          </a:fillRef>
+          <a:effectRef idx="0">
+            <a:schemeClr val="accent1"/>
+          </a:effectRef>
+          <a:fontRef idx="minor">
+            <a:schemeClr val="lt1"/>
+          </a:fontRef>
+        </p:style>
+        <p:txBody>
+          <a:bodyPr rtlCol="0" anchor="ctr"/>
+          <a:lstStyle/>
+          <a:p>
+            <a:pPr algn="ctr"/>
+            <a:r>
+              <a:rPr lang="en-SG" sz="1600" dirty="0">
+                <a:solidFill>
+                  <a:schemeClr val="tx1"/>
+                </a:solidFill>
+              </a:rPr>
+              <a:t>IoT Hub</a:t>
+            </a:r>
+          </a:p>
+        </p:txBody>
+      </p:sp>
+      <p:sp>
+        <p:nvSpPr>
+          <p:cNvPr id="54" name="Rectangle 53">
+            <a:extLst>
+              <a:ext uri="{FF2B5EF4-FFF2-40B4-BE49-F238E27FC236}">
+                <a16:creationId xmlns:a16="http://schemas.microsoft.com/office/drawing/2014/main" id="{99908F23-DC0D-5C60-10FE-C88779EA2287}"/>
+              </a:ext>
+            </a:extLst>
+          </p:cNvPr>
+          <p:cNvSpPr/>
+          <p:nvPr/>
+        </p:nvSpPr>
+        <p:spPr>
+          <a:xfrm>
+            <a:off x="4711646" y="3215638"/>
+            <a:ext cx="989508" cy="632461"/>
+          </a:xfrm>
+          <a:prstGeom prst="rect">
+            <a:avLst/>
+          </a:prstGeom>
+          <a:solidFill>
+            <a:schemeClr val="accent6">
+              <a:lumMod val="60000"/>
+              <a:lumOff val="40000"/>
+            </a:schemeClr>
+          </a:solidFill>
+          <a:ln>
+            <a:noFill/>
+          </a:ln>
+        </p:spPr>
+        <p:style>
+          <a:lnRef idx="2">
+            <a:schemeClr val="accent1">
+              <a:shade val="15000"/>
+            </a:schemeClr>
+          </a:lnRef>
+          <a:fillRef idx="1">
+            <a:schemeClr val="accent1"/>
+          </a:fillRef>
+          <a:effectRef idx="0">
+            <a:schemeClr val="accent1"/>
+          </a:effectRef>
+          <a:fontRef idx="minor">
+            <a:schemeClr val="lt1"/>
+          </a:fontRef>
+        </p:style>
+        <p:txBody>
+          <a:bodyPr rtlCol="0" anchor="ctr"/>
+          <a:lstStyle/>
+          <a:p>
+            <a:pPr algn="ctr"/>
+            <a:r>
+              <a:rPr lang="en-SG" sz="1600" dirty="0">
+                <a:solidFill>
+                  <a:schemeClr val="tx1"/>
+                </a:solidFill>
+              </a:rPr>
+              <a:t>Firewall</a:t>
+            </a:r>
+          </a:p>
+        </p:txBody>
+      </p:sp>
+      <p:sp>
+        <p:nvSpPr>
+          <p:cNvPr id="55" name="Rectangle 54">
+            <a:extLst>
+              <a:ext uri="{FF2B5EF4-FFF2-40B4-BE49-F238E27FC236}">
+                <a16:creationId xmlns:a16="http://schemas.microsoft.com/office/drawing/2014/main" id="{9652DAB4-FCB4-0EC7-10CF-9824A4F0EAE0}"/>
+              </a:ext>
+            </a:extLst>
+          </p:cNvPr>
+          <p:cNvSpPr/>
+          <p:nvPr/>
+        </p:nvSpPr>
+        <p:spPr>
+          <a:xfrm>
+            <a:off x="5581152" y="2506978"/>
+            <a:ext cx="769620" cy="632461"/>
+          </a:xfrm>
+          <a:prstGeom prst="rect">
+            <a:avLst/>
+          </a:prstGeom>
+          <a:solidFill>
+            <a:schemeClr val="accent6">
+              <a:lumMod val="60000"/>
+              <a:lumOff val="40000"/>
+            </a:schemeClr>
+          </a:solidFill>
+          <a:ln>
+            <a:noFill/>
+          </a:ln>
+        </p:spPr>
+        <p:style>
+          <a:lnRef idx="2">
+            <a:schemeClr val="accent1">
+              <a:shade val="15000"/>
+            </a:schemeClr>
+          </a:lnRef>
+          <a:fillRef idx="1">
+            <a:schemeClr val="accent1"/>
+          </a:fillRef>
+          <a:effectRef idx="0">
+            <a:schemeClr val="accent1"/>
+          </a:effectRef>
+          <a:fontRef idx="minor">
+            <a:schemeClr val="lt1"/>
+          </a:fontRef>
+        </p:style>
+        <p:txBody>
+          <a:bodyPr rtlCol="0" anchor="ctr"/>
+          <a:lstStyle/>
+          <a:p>
+            <a:pPr algn="ctr"/>
+            <a:r>
+              <a:rPr lang="en-SG" sz="1600" dirty="0">
+                <a:solidFill>
+                  <a:schemeClr val="tx1"/>
+                </a:solidFill>
+              </a:rPr>
+              <a:t>VM 2</a:t>
+            </a:r>
+          </a:p>
+        </p:txBody>
+      </p:sp>
+      <p:sp>
+        <p:nvSpPr>
+          <p:cNvPr id="56" name="Rectangle 55">
+            <a:extLst>
+              <a:ext uri="{FF2B5EF4-FFF2-40B4-BE49-F238E27FC236}">
+                <a16:creationId xmlns:a16="http://schemas.microsoft.com/office/drawing/2014/main" id="{8DB8A502-2E2D-840D-0B5D-2F5EFE7C53C1}"/>
+              </a:ext>
+            </a:extLst>
+          </p:cNvPr>
+          <p:cNvSpPr/>
+          <p:nvPr/>
+        </p:nvSpPr>
+        <p:spPr>
+          <a:xfrm>
+            <a:off x="6398676" y="2506978"/>
+            <a:ext cx="1148144" cy="632461"/>
+          </a:xfrm>
+          <a:prstGeom prst="rect">
+            <a:avLst/>
+          </a:prstGeom>
+          <a:solidFill>
+            <a:srgbClr val="FFC000"/>
+          </a:solidFill>
+          <a:ln>
+            <a:noFill/>
+          </a:ln>
+        </p:spPr>
+        <p:style>
+          <a:lnRef idx="2">
+            <a:schemeClr val="accent1">
+              <a:shade val="15000"/>
+            </a:schemeClr>
+          </a:lnRef>
+          <a:fillRef idx="1">
+            <a:schemeClr val="accent1"/>
+          </a:fillRef>
+          <a:effectRef idx="0">
+            <a:schemeClr val="accent1"/>
+          </a:effectRef>
+          <a:fontRef idx="minor">
+            <a:schemeClr val="lt1"/>
+          </a:fontRef>
+        </p:style>
+        <p:txBody>
+          <a:bodyPr rtlCol="0" anchor="ctr"/>
+          <a:lstStyle/>
+          <a:p>
+            <a:pPr algn="ctr"/>
+            <a:r>
+              <a:rPr lang="en-SG" sz="1600" dirty="0">
+                <a:solidFill>
+                  <a:schemeClr val="tx1"/>
+                </a:solidFill>
+              </a:rPr>
+              <a:t>VM 3</a:t>
+            </a:r>
+          </a:p>
+          <a:p>
+            <a:pPr algn="ctr"/>
+            <a:r>
+              <a:rPr lang="en-SG" sz="1600" dirty="0">
+                <a:solidFill>
+                  <a:schemeClr val="tx1"/>
+                </a:solidFill>
+              </a:rPr>
+              <a:t>CPU&gt;90</a:t>
+            </a:r>
+          </a:p>
+        </p:txBody>
+      </p:sp>
+      <p:cxnSp>
+        <p:nvCxnSpPr>
+          <p:cNvPr id="57" name="Straight Arrow Connector 56">
+            <a:extLst>
+              <a:ext uri="{FF2B5EF4-FFF2-40B4-BE49-F238E27FC236}">
+                <a16:creationId xmlns:a16="http://schemas.microsoft.com/office/drawing/2014/main" id="{3D5A4F33-3F6D-C991-556F-06EA00C8356C}"/>
+              </a:ext>
+            </a:extLst>
+          </p:cNvPr>
+          <p:cNvCxnSpPr>
+            <a:cxnSpLocks/>
+            <a:stCxn id="56" idx="0"/>
+            <a:endCxn id="47" idx="2"/>
+          </p:cNvCxnSpPr>
+          <p:nvPr/>
+        </p:nvCxnSpPr>
+        <p:spPr>
+          <a:xfrm flipH="1" flipV="1">
+            <a:off x="6444786" y="1449991"/>
+            <a:ext cx="527962" cy="1056987"/>
+          </a:xfrm>
+          <a:prstGeom prst="straightConnector1">
+            <a:avLst/>
+          </a:prstGeom>
+          <a:ln>
+            <a:solidFill>
+              <a:srgbClr val="FFC000"/>
+            </a:solidFill>
+            <a:prstDash val="sysDash"/>
+            <a:tailEnd type="triangle"/>
+          </a:ln>
+        </p:spPr>
+        <p:style>
+          <a:lnRef idx="2">
+            <a:schemeClr val="accent1"/>
+          </a:lnRef>
+          <a:fillRef idx="0">
+            <a:schemeClr val="accent1"/>
+          </a:fillRef>
+          <a:effectRef idx="1">
+            <a:schemeClr val="accent1"/>
+          </a:effectRef>
+          <a:fontRef idx="minor">
+            <a:schemeClr val="tx1"/>
+          </a:fontRef>
+        </p:style>
+      </p:cxnSp>
+      <p:sp>
+        <p:nvSpPr>
+          <p:cNvPr id="59" name="TextBox 58">
+            <a:extLst>
+              <a:ext uri="{FF2B5EF4-FFF2-40B4-BE49-F238E27FC236}">
+                <a16:creationId xmlns:a16="http://schemas.microsoft.com/office/drawing/2014/main" id="{1AD7FC4D-E578-E428-E002-EE5CEC672421}"/>
+              </a:ext>
+            </a:extLst>
+          </p:cNvPr>
+          <p:cNvSpPr txBox="1"/>
+          <p:nvPr/>
+        </p:nvSpPr>
+        <p:spPr>
+          <a:xfrm>
+            <a:off x="4416711" y="4113011"/>
+            <a:ext cx="2782172" cy="369332"/>
+          </a:xfrm>
+          <a:prstGeom prst="rect">
+            <a:avLst/>
+          </a:prstGeom>
+          <a:noFill/>
+        </p:spPr>
+        <p:txBody>
+          <a:bodyPr wrap="none" rtlCol="0">
+            <a:spAutoFit/>
+          </a:bodyPr>
+          <a:lstStyle/>
+          <a:p>
+            <a:r>
+              <a:rPr lang="en-SG" dirty="0"/>
+              <a:t>Tier 2 Cloud Crafty system</a:t>
+            </a:r>
+          </a:p>
+        </p:txBody>
+      </p:sp>
+    </p:spTree>
+    <p:extLst>
+      <p:ext uri="{BB962C8B-B14F-4D97-AF65-F5344CB8AC3E}">
+        <p14:creationId xmlns:p14="http://schemas.microsoft.com/office/powerpoint/2010/main" val="3943084166"/>
+      </p:ext>
+    </p:extLst>
+  </p:cSld>
+  <p:clrMapOvr>
+    <a:masterClrMapping/>
+  </p:clrMapOvr>
+</p:sld>
+</file>
+
+<file path=ppt/slides/slide4.xml><?xml version="1.0" encoding="utf-8"?>
+<p:sld xmlns:a="http://schemas.openxmlformats.org/drawingml/2006/main" xmlns:r="http://schemas.openxmlformats.org/officeDocument/2006/relationships" xmlns:p="http://schemas.openxmlformats.org/presentationml/2006/main">
+  <p:cSld>
+    <p:spTree>
+      <p:nvGrpSpPr>
+        <p:cNvPr id="1" name="">
+          <a:extLst>
+            <a:ext uri="{FF2B5EF4-FFF2-40B4-BE49-F238E27FC236}">
+              <a16:creationId xmlns:a16="http://schemas.microsoft.com/office/drawing/2014/main" id="{50C77A29-FBB2-6FDF-1EF7-C97E3CFA2DB9}"/>
+            </a:ext>
+          </a:extLst>
+        </p:cNvPr>
+        <p:cNvGrpSpPr/>
+        <p:nvPr/>
+      </p:nvGrpSpPr>
+      <p:grpSpPr>
+        <a:xfrm>
+          <a:off x="0" y="0"/>
+          <a:ext cx="0" cy="0"/>
+          <a:chOff x="0" y="0"/>
+          <a:chExt cx="0" cy="0"/>
+        </a:xfrm>
+      </p:grpSpPr>
+      <p:sp>
+        <p:nvSpPr>
+          <p:cNvPr id="24" name="Rectangle 23">
+            <a:extLst>
+              <a:ext uri="{FF2B5EF4-FFF2-40B4-BE49-F238E27FC236}">
+                <a16:creationId xmlns:a16="http://schemas.microsoft.com/office/drawing/2014/main" id="{80685DE8-AE30-B50C-8F6F-73A4FC7E2816}"/>
+              </a:ext>
+            </a:extLst>
+          </p:cNvPr>
+          <p:cNvSpPr/>
+          <p:nvPr/>
+        </p:nvSpPr>
+        <p:spPr>
+          <a:xfrm>
+            <a:off x="4861560" y="2222660"/>
+            <a:ext cx="3299459" cy="2529840"/>
+          </a:xfrm>
+          <a:prstGeom prst="rect">
+            <a:avLst/>
+          </a:prstGeom>
+          <a:solidFill>
+            <a:schemeClr val="bg1"/>
+          </a:solidFill>
+        </p:spPr>
+        <p:style>
+          <a:lnRef idx="2">
+            <a:schemeClr val="accent1">
+              <a:shade val="15000"/>
+            </a:schemeClr>
+          </a:lnRef>
+          <a:fillRef idx="1">
+            <a:schemeClr val="accent1"/>
+          </a:fillRef>
+          <a:effectRef idx="0">
+            <a:schemeClr val="accent1"/>
+          </a:effectRef>
+          <a:fontRef idx="minor">
+            <a:schemeClr val="lt1"/>
+          </a:fontRef>
+        </p:style>
+        <p:txBody>
+          <a:bodyPr rtlCol="0" anchor="ctr"/>
+          <a:lstStyle/>
+          <a:p>
+            <a:pPr algn="ctr"/>
+            <a:endParaRPr lang="en-SG"/>
+          </a:p>
+        </p:txBody>
+      </p:sp>
+      <p:sp>
+        <p:nvSpPr>
+          <p:cNvPr id="25" name="TextBox 24">
+            <a:extLst>
+              <a:ext uri="{FF2B5EF4-FFF2-40B4-BE49-F238E27FC236}">
+                <a16:creationId xmlns:a16="http://schemas.microsoft.com/office/drawing/2014/main" id="{5413627E-4EBE-B76D-BCD5-4FE00EE90FB9}"/>
+              </a:ext>
+            </a:extLst>
+          </p:cNvPr>
+          <p:cNvSpPr txBox="1"/>
+          <p:nvPr/>
+        </p:nvSpPr>
+        <p:spPr>
+          <a:xfrm>
+            <a:off x="4783250" y="4844381"/>
+            <a:ext cx="2957861" cy="646331"/>
+          </a:xfrm>
+          <a:prstGeom prst="rect">
+            <a:avLst/>
+          </a:prstGeom>
+          <a:noFill/>
+        </p:spPr>
+        <p:txBody>
+          <a:bodyPr wrap="none" rtlCol="0">
+            <a:spAutoFit/>
+          </a:bodyPr>
+          <a:lstStyle/>
+          <a:p>
+            <a:r>
+              <a:rPr lang="en-SG" dirty="0"/>
+              <a:t>Tier 1 </a:t>
+            </a:r>
+            <a:r>
+              <a:rPr lang="en-SG" b="0" i="0" dirty="0">
+                <a:effectLst/>
+                <a:latin typeface="Arial" panose="020B0604020202020204" pitchFamily="34" charset="0"/>
+              </a:rPr>
+              <a:t> Enigma Hub system </a:t>
+            </a:r>
+            <a:endParaRPr lang="en-SG" dirty="0"/>
+          </a:p>
+          <a:p>
+            <a:endParaRPr lang="en-SG" dirty="0"/>
+          </a:p>
+        </p:txBody>
+      </p:sp>
+      <p:sp>
+        <p:nvSpPr>
+          <p:cNvPr id="26" name="Rectangle 25">
+            <a:extLst>
+              <a:ext uri="{FF2B5EF4-FFF2-40B4-BE49-F238E27FC236}">
+                <a16:creationId xmlns:a16="http://schemas.microsoft.com/office/drawing/2014/main" id="{2035F88B-63D6-0D60-9E3B-244EB0F5E479}"/>
+              </a:ext>
+            </a:extLst>
+          </p:cNvPr>
+          <p:cNvSpPr/>
+          <p:nvPr/>
+        </p:nvSpPr>
+        <p:spPr>
+          <a:xfrm>
+            <a:off x="5044155" y="2466499"/>
+            <a:ext cx="769620" cy="632461"/>
+          </a:xfrm>
+          <a:prstGeom prst="rect">
+            <a:avLst/>
+          </a:prstGeom>
+          <a:solidFill>
+            <a:schemeClr val="accent6">
+              <a:lumMod val="60000"/>
+              <a:lumOff val="40000"/>
+            </a:schemeClr>
+          </a:solidFill>
+          <a:ln>
+            <a:noFill/>
+          </a:ln>
+        </p:spPr>
+        <p:style>
+          <a:lnRef idx="2">
+            <a:schemeClr val="accent1">
+              <a:shade val="15000"/>
+            </a:schemeClr>
+          </a:lnRef>
+          <a:fillRef idx="1">
+            <a:schemeClr val="accent1"/>
+          </a:fillRef>
+          <a:effectRef idx="0">
+            <a:schemeClr val="accent1"/>
+          </a:effectRef>
+          <a:fontRef idx="minor">
+            <a:schemeClr val="lt1"/>
+          </a:fontRef>
+        </p:style>
+        <p:txBody>
+          <a:bodyPr rtlCol="0" anchor="ctr"/>
+          <a:lstStyle/>
+          <a:p>
+            <a:pPr algn="ctr"/>
+            <a:r>
+              <a:rPr lang="en-SG" sz="1600" dirty="0">
+                <a:solidFill>
+                  <a:schemeClr val="tx1"/>
+                </a:solidFill>
+              </a:rPr>
+              <a:t>Event Hub</a:t>
+            </a:r>
+          </a:p>
+        </p:txBody>
+      </p:sp>
+      <p:sp>
+        <p:nvSpPr>
+          <p:cNvPr id="27" name="Rectangle 26">
+            <a:extLst>
+              <a:ext uri="{FF2B5EF4-FFF2-40B4-BE49-F238E27FC236}">
+                <a16:creationId xmlns:a16="http://schemas.microsoft.com/office/drawing/2014/main" id="{E52CDF22-874E-6017-3161-7537D5996CC9}"/>
+              </a:ext>
+            </a:extLst>
+          </p:cNvPr>
+          <p:cNvSpPr/>
+          <p:nvPr/>
+        </p:nvSpPr>
+        <p:spPr>
+          <a:xfrm>
+            <a:off x="5068107" y="3892566"/>
+            <a:ext cx="1088567" cy="632461"/>
+          </a:xfrm>
+          <a:prstGeom prst="rect">
+            <a:avLst/>
+          </a:prstGeom>
+          <a:solidFill>
+            <a:schemeClr val="accent6">
+              <a:lumMod val="60000"/>
+              <a:lumOff val="40000"/>
+            </a:schemeClr>
+          </a:solidFill>
+          <a:ln>
+            <a:noFill/>
+          </a:ln>
+        </p:spPr>
+        <p:style>
+          <a:lnRef idx="2">
+            <a:schemeClr val="accent1">
+              <a:shade val="15000"/>
+            </a:schemeClr>
+          </a:lnRef>
+          <a:fillRef idx="1">
+            <a:schemeClr val="accent1"/>
+          </a:fillRef>
+          <a:effectRef idx="0">
+            <a:schemeClr val="accent1"/>
+          </a:effectRef>
+          <a:fontRef idx="minor">
+            <a:schemeClr val="lt1"/>
+          </a:fontRef>
+        </p:style>
+        <p:txBody>
+          <a:bodyPr rtlCol="0" anchor="ctr"/>
+          <a:lstStyle/>
+          <a:p>
+            <a:pPr algn="ctr"/>
+            <a:r>
+              <a:rPr lang="en-SG" sz="1600" dirty="0">
+                <a:solidFill>
+                  <a:schemeClr val="tx1"/>
+                </a:solidFill>
+              </a:rPr>
+              <a:t>App Gateway</a:t>
+            </a:r>
+          </a:p>
+        </p:txBody>
+      </p:sp>
+      <p:sp>
+        <p:nvSpPr>
+          <p:cNvPr id="28" name="Rectangle 27">
+            <a:extLst>
+              <a:ext uri="{FF2B5EF4-FFF2-40B4-BE49-F238E27FC236}">
+                <a16:creationId xmlns:a16="http://schemas.microsoft.com/office/drawing/2014/main" id="{D912F19E-8462-5E2E-8296-BB2D6833B5E5}"/>
+              </a:ext>
+            </a:extLst>
+          </p:cNvPr>
+          <p:cNvSpPr/>
+          <p:nvPr/>
+        </p:nvSpPr>
+        <p:spPr>
+          <a:xfrm>
+            <a:off x="6177208" y="3171348"/>
+            <a:ext cx="925324" cy="632461"/>
+          </a:xfrm>
+          <a:prstGeom prst="rect">
+            <a:avLst/>
+          </a:prstGeom>
+          <a:solidFill>
+            <a:schemeClr val="accent6">
+              <a:lumMod val="60000"/>
+              <a:lumOff val="40000"/>
+            </a:schemeClr>
+          </a:solidFill>
+          <a:ln>
+            <a:noFill/>
+          </a:ln>
+        </p:spPr>
+        <p:style>
+          <a:lnRef idx="2">
+            <a:schemeClr val="accent1">
+              <a:shade val="15000"/>
+            </a:schemeClr>
+          </a:lnRef>
+          <a:fillRef idx="1">
+            <a:schemeClr val="accent1"/>
+          </a:fillRef>
+          <a:effectRef idx="0">
+            <a:schemeClr val="accent1"/>
+          </a:effectRef>
+          <a:fontRef idx="minor">
+            <a:schemeClr val="lt1"/>
+          </a:fontRef>
+        </p:style>
+        <p:txBody>
+          <a:bodyPr rtlCol="0" anchor="ctr"/>
+          <a:lstStyle/>
+          <a:p>
+            <a:pPr algn="ctr"/>
+            <a:r>
+              <a:rPr lang="en-SG" sz="1400" dirty="0">
+                <a:solidFill>
+                  <a:schemeClr val="tx1"/>
+                </a:solidFill>
+              </a:rPr>
+              <a:t>Function</a:t>
+            </a:r>
+          </a:p>
+        </p:txBody>
+      </p:sp>
+      <p:sp>
+        <p:nvSpPr>
+          <p:cNvPr id="29" name="Rectangle 28">
+            <a:extLst>
+              <a:ext uri="{FF2B5EF4-FFF2-40B4-BE49-F238E27FC236}">
+                <a16:creationId xmlns:a16="http://schemas.microsoft.com/office/drawing/2014/main" id="{89325611-8715-C3D3-A774-00E7081EE5F7}"/>
+              </a:ext>
+            </a:extLst>
+          </p:cNvPr>
+          <p:cNvSpPr/>
+          <p:nvPr/>
+        </p:nvSpPr>
+        <p:spPr>
+          <a:xfrm>
+            <a:off x="5068107" y="3175158"/>
+            <a:ext cx="989508" cy="632461"/>
+          </a:xfrm>
+          <a:prstGeom prst="rect">
+            <a:avLst/>
+          </a:prstGeom>
+          <a:solidFill>
+            <a:schemeClr val="accent6">
+              <a:lumMod val="60000"/>
+              <a:lumOff val="40000"/>
+            </a:schemeClr>
+          </a:solidFill>
+          <a:ln>
+            <a:noFill/>
+          </a:ln>
+        </p:spPr>
+        <p:style>
+          <a:lnRef idx="2">
+            <a:schemeClr val="accent1">
+              <a:shade val="15000"/>
+            </a:schemeClr>
+          </a:lnRef>
+          <a:fillRef idx="1">
+            <a:schemeClr val="accent1"/>
+          </a:fillRef>
+          <a:effectRef idx="0">
+            <a:schemeClr val="accent1"/>
+          </a:effectRef>
+          <a:fontRef idx="minor">
+            <a:schemeClr val="lt1"/>
+          </a:fontRef>
+        </p:style>
+        <p:txBody>
+          <a:bodyPr rtlCol="0" anchor="ctr"/>
+          <a:lstStyle/>
+          <a:p>
+            <a:pPr algn="ctr"/>
+            <a:r>
+              <a:rPr lang="en-SG" sz="1600" dirty="0">
+                <a:solidFill>
+                  <a:schemeClr val="tx1"/>
+                </a:solidFill>
+              </a:rPr>
+              <a:t>Bastion</a:t>
+            </a:r>
+          </a:p>
+        </p:txBody>
+      </p:sp>
+      <p:sp>
+        <p:nvSpPr>
+          <p:cNvPr id="30" name="Rectangle 29">
+            <a:extLst>
+              <a:ext uri="{FF2B5EF4-FFF2-40B4-BE49-F238E27FC236}">
+                <a16:creationId xmlns:a16="http://schemas.microsoft.com/office/drawing/2014/main" id="{F633AC8C-C869-33DB-8D56-D0E061BD8E34}"/>
+              </a:ext>
+            </a:extLst>
+          </p:cNvPr>
+          <p:cNvSpPr/>
+          <p:nvPr/>
+        </p:nvSpPr>
+        <p:spPr>
+          <a:xfrm>
+            <a:off x="5937613" y="2466498"/>
+            <a:ext cx="769620" cy="632461"/>
+          </a:xfrm>
+          <a:prstGeom prst="rect">
+            <a:avLst/>
+          </a:prstGeom>
+          <a:solidFill>
+            <a:schemeClr val="accent6">
+              <a:lumMod val="60000"/>
+              <a:lumOff val="40000"/>
+            </a:schemeClr>
+          </a:solidFill>
+          <a:ln>
+            <a:noFill/>
+          </a:ln>
+        </p:spPr>
+        <p:style>
+          <a:lnRef idx="2">
+            <a:schemeClr val="accent1">
+              <a:shade val="15000"/>
+            </a:schemeClr>
+          </a:lnRef>
+          <a:fillRef idx="1">
+            <a:schemeClr val="accent1"/>
+          </a:fillRef>
+          <a:effectRef idx="0">
+            <a:schemeClr val="accent1"/>
+          </a:effectRef>
+          <a:fontRef idx="minor">
+            <a:schemeClr val="lt1"/>
+          </a:fontRef>
+        </p:style>
+        <p:txBody>
+          <a:bodyPr rtlCol="0" anchor="ctr"/>
+          <a:lstStyle/>
+          <a:p>
+            <a:pPr algn="ctr"/>
+            <a:r>
+              <a:rPr lang="en-SG" sz="1600" dirty="0">
+                <a:solidFill>
+                  <a:schemeClr val="tx1"/>
+                </a:solidFill>
+              </a:rPr>
+              <a:t>Redis</a:t>
+            </a:r>
+          </a:p>
+        </p:txBody>
+      </p:sp>
+      <p:sp>
+        <p:nvSpPr>
+          <p:cNvPr id="31" name="Rectangle 30">
+            <a:extLst>
+              <a:ext uri="{FF2B5EF4-FFF2-40B4-BE49-F238E27FC236}">
+                <a16:creationId xmlns:a16="http://schemas.microsoft.com/office/drawing/2014/main" id="{1B7EEA67-3857-EEB1-D3AB-B09338007EBE}"/>
+              </a:ext>
+            </a:extLst>
+          </p:cNvPr>
+          <p:cNvSpPr/>
+          <p:nvPr/>
+        </p:nvSpPr>
+        <p:spPr>
+          <a:xfrm>
+            <a:off x="6262181" y="3876198"/>
+            <a:ext cx="1148144" cy="632461"/>
+          </a:xfrm>
+          <a:prstGeom prst="rect">
+            <a:avLst/>
+          </a:prstGeom>
+          <a:solidFill>
+            <a:srgbClr val="FF0000"/>
+          </a:solidFill>
+          <a:ln>
+            <a:noFill/>
+          </a:ln>
+        </p:spPr>
+        <p:style>
+          <a:lnRef idx="2">
+            <a:schemeClr val="accent1">
+              <a:shade val="15000"/>
+            </a:schemeClr>
+          </a:lnRef>
+          <a:fillRef idx="1">
+            <a:schemeClr val="accent1"/>
+          </a:fillRef>
+          <a:effectRef idx="0">
+            <a:schemeClr val="accent1"/>
+          </a:effectRef>
+          <a:fontRef idx="minor">
+            <a:schemeClr val="lt1"/>
+          </a:fontRef>
+        </p:style>
+        <p:txBody>
+          <a:bodyPr rtlCol="0" anchor="ctr"/>
+          <a:lstStyle/>
+          <a:p>
+            <a:pPr algn="ctr"/>
+            <a:r>
+              <a:rPr lang="en-SG" sz="1600" dirty="0">
+                <a:solidFill>
+                  <a:schemeClr val="bg1"/>
+                </a:solidFill>
+              </a:rPr>
+              <a:t>AKV</a:t>
+            </a:r>
+          </a:p>
+        </p:txBody>
+      </p:sp>
+      <p:cxnSp>
+        <p:nvCxnSpPr>
+          <p:cNvPr id="36" name="Connector: Elbow 35">
+            <a:extLst>
+              <a:ext uri="{FF2B5EF4-FFF2-40B4-BE49-F238E27FC236}">
+                <a16:creationId xmlns:a16="http://schemas.microsoft.com/office/drawing/2014/main" id="{7F7B6C09-B371-C7E4-8C63-BB05AFE28382}"/>
+              </a:ext>
+            </a:extLst>
+          </p:cNvPr>
+          <p:cNvCxnSpPr>
+            <a:cxnSpLocks/>
+            <a:stCxn id="31" idx="3"/>
+            <a:endCxn id="35" idx="2"/>
+          </p:cNvCxnSpPr>
+          <p:nvPr/>
+        </p:nvCxnSpPr>
+        <p:spPr>
+          <a:xfrm flipV="1">
+            <a:off x="7410325" y="1542478"/>
+            <a:ext cx="952385" cy="2649951"/>
+          </a:xfrm>
+          <a:prstGeom prst="bentConnector2">
+            <a:avLst/>
+          </a:prstGeom>
+          <a:ln>
+            <a:solidFill>
+              <a:srgbClr val="FF0000"/>
+            </a:solidFill>
+            <a:prstDash val="sysDash"/>
+            <a:tailEnd type="triangle"/>
+          </a:ln>
+        </p:spPr>
+        <p:style>
+          <a:lnRef idx="2">
+            <a:schemeClr val="accent1"/>
+          </a:lnRef>
+          <a:fillRef idx="0">
+            <a:schemeClr val="accent1"/>
+          </a:fillRef>
+          <a:effectRef idx="1">
+            <a:schemeClr val="accent1"/>
+          </a:effectRef>
+          <a:fontRef idx="minor">
+            <a:schemeClr val="tx1"/>
+          </a:fontRef>
+        </p:style>
+      </p:cxnSp>
+      <p:sp>
+        <p:nvSpPr>
+          <p:cNvPr id="2" name="Rectangle 1">
+            <a:extLst>
+              <a:ext uri="{FF2B5EF4-FFF2-40B4-BE49-F238E27FC236}">
+                <a16:creationId xmlns:a16="http://schemas.microsoft.com/office/drawing/2014/main" id="{DFBC5E56-35A5-D04A-A27A-289D5FF5256F}"/>
+              </a:ext>
+            </a:extLst>
+          </p:cNvPr>
+          <p:cNvSpPr/>
+          <p:nvPr/>
+        </p:nvSpPr>
+        <p:spPr>
+          <a:xfrm>
+            <a:off x="3458898" y="834675"/>
+            <a:ext cx="1798320" cy="716280"/>
+          </a:xfrm>
+          <a:prstGeom prst="rect">
+            <a:avLst/>
+          </a:prstGeom>
+          <a:solidFill>
+            <a:schemeClr val="accent6">
+              <a:lumMod val="60000"/>
+              <a:lumOff val="40000"/>
+            </a:schemeClr>
+          </a:solidFill>
+          <a:ln>
+            <a:noFill/>
+          </a:ln>
+        </p:spPr>
+        <p:style>
+          <a:lnRef idx="2">
+            <a:schemeClr val="accent1">
+              <a:shade val="15000"/>
+            </a:schemeClr>
+          </a:lnRef>
+          <a:fillRef idx="1">
+            <a:schemeClr val="accent1"/>
+          </a:fillRef>
+          <a:effectRef idx="0">
+            <a:schemeClr val="accent1"/>
+          </a:effectRef>
+          <a:fontRef idx="minor">
+            <a:schemeClr val="lt1"/>
+          </a:fontRef>
+        </p:style>
+        <p:txBody>
+          <a:bodyPr rtlCol="0" anchor="ctr"/>
+          <a:lstStyle/>
+          <a:p>
+            <a:pPr algn="ctr"/>
+            <a:r>
+              <a:rPr lang="en-SG" dirty="0">
+                <a:solidFill>
+                  <a:schemeClr val="tx1"/>
+                </a:solidFill>
+              </a:rPr>
+              <a:t>Pocket Geek</a:t>
+            </a:r>
+          </a:p>
+          <a:p>
+            <a:pPr algn="ctr"/>
+            <a:r>
+              <a:rPr lang="en-SG" dirty="0">
+                <a:solidFill>
+                  <a:schemeClr val="tx1"/>
+                </a:solidFill>
+              </a:rPr>
+              <a:t>system</a:t>
+            </a:r>
+          </a:p>
+        </p:txBody>
+      </p:sp>
+      <p:cxnSp>
+        <p:nvCxnSpPr>
+          <p:cNvPr id="3" name="Straight Connector 2">
+            <a:extLst>
+              <a:ext uri="{FF2B5EF4-FFF2-40B4-BE49-F238E27FC236}">
+                <a16:creationId xmlns:a16="http://schemas.microsoft.com/office/drawing/2014/main" id="{5D5AF677-F2CA-5578-9DFC-431A7F40D83E}"/>
+              </a:ext>
+            </a:extLst>
+          </p:cNvPr>
+          <p:cNvCxnSpPr>
+            <a:cxnSpLocks/>
+          </p:cNvCxnSpPr>
+          <p:nvPr/>
+        </p:nvCxnSpPr>
+        <p:spPr>
+          <a:xfrm>
+            <a:off x="3131238" y="1892140"/>
+            <a:ext cx="6545580" cy="0"/>
+          </a:xfrm>
+          <a:prstGeom prst="line">
+            <a:avLst/>
+          </a:prstGeom>
+        </p:spPr>
+        <p:style>
+          <a:lnRef idx="2">
+            <a:schemeClr val="accent1"/>
+          </a:lnRef>
+          <a:fillRef idx="0">
+            <a:schemeClr val="accent1"/>
+          </a:fillRef>
+          <a:effectRef idx="1">
+            <a:schemeClr val="accent1"/>
+          </a:effectRef>
+          <a:fontRef idx="minor">
+            <a:schemeClr val="tx1"/>
+          </a:fontRef>
+        </p:style>
+      </p:cxnSp>
+      <p:sp>
+        <p:nvSpPr>
+          <p:cNvPr id="7" name="TextBox 6">
+            <a:extLst>
+              <a:ext uri="{FF2B5EF4-FFF2-40B4-BE49-F238E27FC236}">
+                <a16:creationId xmlns:a16="http://schemas.microsoft.com/office/drawing/2014/main" id="{96453B58-AC3D-F4CD-BA5B-C6DBE590F3E2}"/>
+              </a:ext>
+            </a:extLst>
+          </p:cNvPr>
+          <p:cNvSpPr txBox="1"/>
+          <p:nvPr/>
+        </p:nvSpPr>
+        <p:spPr>
+          <a:xfrm>
+            <a:off x="1704325" y="1471401"/>
+            <a:ext cx="1456553" cy="553998"/>
+          </a:xfrm>
+          <a:prstGeom prst="rect">
+            <a:avLst/>
+          </a:prstGeom>
+          <a:noFill/>
+        </p:spPr>
+        <p:txBody>
+          <a:bodyPr wrap="none" rtlCol="0">
+            <a:spAutoFit/>
+          </a:bodyPr>
+          <a:lstStyle/>
+          <a:p>
+            <a:pPr algn="ctr"/>
+            <a:r>
+              <a:rPr lang="en-SG" dirty="0"/>
+              <a:t>Tier 0</a:t>
+            </a:r>
+          </a:p>
+          <a:p>
+            <a:pPr algn="ctr"/>
+            <a:r>
+              <a:rPr lang="en-SG" sz="1200" dirty="0"/>
+              <a:t>(summary of Tier 1)</a:t>
+            </a:r>
+          </a:p>
+        </p:txBody>
+      </p:sp>
+      <p:sp>
+        <p:nvSpPr>
+          <p:cNvPr id="33" name="Rectangle 32">
+            <a:extLst>
+              <a:ext uri="{FF2B5EF4-FFF2-40B4-BE49-F238E27FC236}">
+                <a16:creationId xmlns:a16="http://schemas.microsoft.com/office/drawing/2014/main" id="{527F3838-5D47-9599-0327-49322646B18B}"/>
+              </a:ext>
+            </a:extLst>
+          </p:cNvPr>
+          <p:cNvSpPr/>
+          <p:nvPr/>
+        </p:nvSpPr>
+        <p:spPr>
+          <a:xfrm>
+            <a:off x="5461224" y="838723"/>
+            <a:ext cx="1798320" cy="716280"/>
+          </a:xfrm>
+          <a:prstGeom prst="rect">
+            <a:avLst/>
+          </a:prstGeom>
+          <a:solidFill>
+            <a:srgbClr val="FFC000"/>
+          </a:solidFill>
+          <a:ln>
+            <a:noFill/>
+          </a:ln>
+        </p:spPr>
+        <p:style>
+          <a:lnRef idx="2">
+            <a:schemeClr val="accent1">
+              <a:shade val="15000"/>
+            </a:schemeClr>
+          </a:lnRef>
+          <a:fillRef idx="1">
+            <a:schemeClr val="accent1"/>
+          </a:fillRef>
+          <a:effectRef idx="0">
+            <a:schemeClr val="accent1"/>
+          </a:effectRef>
+          <a:fontRef idx="minor">
+            <a:schemeClr val="lt1"/>
+          </a:fontRef>
+        </p:style>
+        <p:txBody>
+          <a:bodyPr rtlCol="0" anchor="ctr"/>
+          <a:lstStyle/>
+          <a:p>
+            <a:pPr algn="ctr"/>
+            <a:r>
+              <a:rPr lang="en-SG" dirty="0">
+                <a:solidFill>
+                  <a:schemeClr val="tx1"/>
+                </a:solidFill>
+              </a:rPr>
+              <a:t>Cloud Crafty</a:t>
+            </a:r>
+          </a:p>
+          <a:p>
+            <a:pPr algn="ctr"/>
+            <a:r>
+              <a:rPr lang="en-SG" dirty="0">
+                <a:solidFill>
+                  <a:schemeClr val="tx1"/>
+                </a:solidFill>
+              </a:rPr>
+              <a:t>system</a:t>
+            </a:r>
+          </a:p>
+        </p:txBody>
+      </p:sp>
+      <p:sp>
+        <p:nvSpPr>
+          <p:cNvPr id="35" name="Rectangle 34">
+            <a:extLst>
+              <a:ext uri="{FF2B5EF4-FFF2-40B4-BE49-F238E27FC236}">
+                <a16:creationId xmlns:a16="http://schemas.microsoft.com/office/drawing/2014/main" id="{59B9F5FE-2B9A-E53D-114E-07525A62F94D}"/>
+              </a:ext>
+            </a:extLst>
+          </p:cNvPr>
+          <p:cNvSpPr/>
+          <p:nvPr/>
+        </p:nvSpPr>
+        <p:spPr>
+          <a:xfrm>
+            <a:off x="7463550" y="826198"/>
+            <a:ext cx="1798320" cy="716280"/>
+          </a:xfrm>
+          <a:prstGeom prst="rect">
+            <a:avLst/>
+          </a:prstGeom>
+          <a:solidFill>
+            <a:srgbClr val="FF0000"/>
+          </a:solidFill>
+          <a:ln>
+            <a:noFill/>
+          </a:ln>
+        </p:spPr>
+        <p:style>
+          <a:lnRef idx="2">
+            <a:schemeClr val="accent1">
+              <a:shade val="15000"/>
+            </a:schemeClr>
+          </a:lnRef>
+          <a:fillRef idx="1">
+            <a:schemeClr val="accent1"/>
+          </a:fillRef>
+          <a:effectRef idx="0">
+            <a:schemeClr val="accent1"/>
+          </a:effectRef>
+          <a:fontRef idx="minor">
+            <a:schemeClr val="lt1"/>
+          </a:fontRef>
+        </p:style>
+        <p:txBody>
+          <a:bodyPr rtlCol="0" anchor="ctr"/>
+          <a:lstStyle/>
+          <a:p>
+            <a:pPr algn="ctr"/>
+            <a:r>
+              <a:rPr lang="en-SG" b="0" i="0" dirty="0">
+                <a:solidFill>
+                  <a:schemeClr val="bg1"/>
+                </a:solidFill>
+                <a:effectLst/>
+                <a:latin typeface="Arial" panose="020B0604020202020204" pitchFamily="34" charset="0"/>
+              </a:rPr>
+              <a:t> Enigma Hub</a:t>
+            </a:r>
+          </a:p>
+          <a:p>
+            <a:pPr algn="ctr"/>
+            <a:r>
+              <a:rPr lang="en-SG" dirty="0">
+                <a:solidFill>
+                  <a:schemeClr val="bg1"/>
+                </a:solidFill>
+                <a:latin typeface="Arial" panose="020B0604020202020204" pitchFamily="34" charset="0"/>
+              </a:rPr>
+              <a:t>system</a:t>
+            </a:r>
+            <a:r>
+              <a:rPr lang="en-SG" b="0" i="0" dirty="0">
+                <a:solidFill>
+                  <a:schemeClr val="bg1"/>
+                </a:solidFill>
+                <a:effectLst/>
+                <a:latin typeface="Arial" panose="020B0604020202020204" pitchFamily="34" charset="0"/>
+              </a:rPr>
+              <a:t> </a:t>
+            </a:r>
+            <a:endParaRPr lang="en-SG" dirty="0">
+              <a:solidFill>
+                <a:schemeClr val="bg1"/>
+              </a:solidFill>
+            </a:endParaRPr>
+          </a:p>
+        </p:txBody>
+      </p:sp>
+      <p:sp>
+        <p:nvSpPr>
+          <p:cNvPr id="39" name="Rectangle 38">
+            <a:extLst>
+              <a:ext uri="{FF2B5EF4-FFF2-40B4-BE49-F238E27FC236}">
+                <a16:creationId xmlns:a16="http://schemas.microsoft.com/office/drawing/2014/main" id="{708499A4-CF53-A542-D47B-3C78AC22C2D4}"/>
+              </a:ext>
+            </a:extLst>
+          </p:cNvPr>
+          <p:cNvSpPr/>
+          <p:nvPr/>
+        </p:nvSpPr>
+        <p:spPr>
+          <a:xfrm>
+            <a:off x="6818738" y="2466498"/>
+            <a:ext cx="1148144" cy="632461"/>
+          </a:xfrm>
+          <a:prstGeom prst="rect">
+            <a:avLst/>
+          </a:prstGeom>
+          <a:solidFill>
+            <a:srgbClr val="FFC000"/>
+          </a:solidFill>
+          <a:ln>
+            <a:noFill/>
+          </a:ln>
+        </p:spPr>
+        <p:style>
+          <a:lnRef idx="2">
+            <a:schemeClr val="accent1">
+              <a:shade val="15000"/>
+            </a:schemeClr>
+          </a:lnRef>
+          <a:fillRef idx="1">
+            <a:schemeClr val="accent1"/>
+          </a:fillRef>
+          <a:effectRef idx="0">
+            <a:schemeClr val="accent1"/>
+          </a:effectRef>
+          <a:fontRef idx="minor">
+            <a:schemeClr val="lt1"/>
+          </a:fontRef>
+        </p:style>
+        <p:txBody>
+          <a:bodyPr rtlCol="0" anchor="ctr"/>
+          <a:lstStyle/>
+          <a:p>
+            <a:pPr algn="ctr"/>
+            <a:r>
+              <a:rPr lang="en-SG" sz="1400" dirty="0">
+                <a:solidFill>
+                  <a:schemeClr val="tx1"/>
+                </a:solidFill>
+              </a:rPr>
+              <a:t>VM</a:t>
+            </a:r>
+          </a:p>
+          <a:p>
+            <a:pPr algn="ctr"/>
+            <a:r>
+              <a:rPr lang="en-SG" sz="1400" dirty="0">
+                <a:solidFill>
+                  <a:schemeClr val="tx1"/>
+                </a:solidFill>
+              </a:rPr>
+              <a:t>Memory&gt;90</a:t>
+            </a:r>
+          </a:p>
+        </p:txBody>
+      </p:sp>
+      <p:cxnSp>
+        <p:nvCxnSpPr>
+          <p:cNvPr id="40" name="Connector: Elbow 39">
+            <a:extLst>
+              <a:ext uri="{FF2B5EF4-FFF2-40B4-BE49-F238E27FC236}">
+                <a16:creationId xmlns:a16="http://schemas.microsoft.com/office/drawing/2014/main" id="{141D4E3E-AF12-BD59-6E32-6954B80AA164}"/>
+              </a:ext>
+            </a:extLst>
+          </p:cNvPr>
+          <p:cNvCxnSpPr>
+            <a:cxnSpLocks/>
+            <a:stCxn id="39" idx="0"/>
+          </p:cNvCxnSpPr>
+          <p:nvPr/>
+        </p:nvCxnSpPr>
+        <p:spPr>
+          <a:xfrm rot="5400000" flipH="1" flipV="1">
+            <a:off x="7248687" y="1695079"/>
+            <a:ext cx="915543" cy="627297"/>
+          </a:xfrm>
+          <a:prstGeom prst="bentConnector3">
+            <a:avLst>
+              <a:gd name="adj1" fmla="val 50000"/>
+            </a:avLst>
+          </a:prstGeom>
+          <a:ln>
+            <a:solidFill>
+              <a:srgbClr val="FFC000"/>
+            </a:solidFill>
+            <a:prstDash val="sysDash"/>
+            <a:tailEnd type="triangle"/>
+          </a:ln>
+        </p:spPr>
+        <p:style>
+          <a:lnRef idx="2">
+            <a:schemeClr val="accent1"/>
+          </a:lnRef>
+          <a:fillRef idx="0">
+            <a:schemeClr val="accent1"/>
+          </a:fillRef>
+          <a:effectRef idx="1">
+            <a:schemeClr val="accent1"/>
+          </a:effectRef>
+          <a:fontRef idx="minor">
+            <a:schemeClr val="tx1"/>
+          </a:fontRef>
+        </p:style>
+      </p:cxnSp>
+      <p:sp>
+        <p:nvSpPr>
+          <p:cNvPr id="42" name="TextBox 41">
+            <a:extLst>
+              <a:ext uri="{FF2B5EF4-FFF2-40B4-BE49-F238E27FC236}">
+                <a16:creationId xmlns:a16="http://schemas.microsoft.com/office/drawing/2014/main" id="{C232F5F2-D6B4-C10F-29F3-956F4040B46C}"/>
+              </a:ext>
+            </a:extLst>
+          </p:cNvPr>
+          <p:cNvSpPr txBox="1"/>
+          <p:nvPr/>
+        </p:nvSpPr>
+        <p:spPr>
+          <a:xfrm>
+            <a:off x="6341517" y="1927904"/>
+            <a:ext cx="1101584" cy="292388"/>
+          </a:xfrm>
+          <a:prstGeom prst="rect">
+            <a:avLst/>
+          </a:prstGeom>
+          <a:noFill/>
+        </p:spPr>
+        <p:txBody>
+          <a:bodyPr wrap="none" rtlCol="0">
+            <a:spAutoFit/>
+          </a:bodyPr>
+          <a:lstStyle/>
+          <a:p>
+            <a:r>
+              <a:rPr lang="en-SG" sz="1300" dirty="0">
+                <a:solidFill>
+                  <a:srgbClr val="FF0000"/>
+                </a:solidFill>
+              </a:rPr>
+              <a:t>Red</a:t>
+            </a:r>
+            <a:r>
+              <a:rPr lang="en-SG" sz="1300" dirty="0"/>
+              <a:t> &gt; </a:t>
+            </a:r>
+            <a:r>
+              <a:rPr lang="en-SG" sz="1300" dirty="0">
+                <a:solidFill>
+                  <a:srgbClr val="FFC000"/>
+                </a:solidFill>
+              </a:rPr>
+              <a:t>Amber</a:t>
+            </a:r>
+          </a:p>
+        </p:txBody>
+      </p:sp>
+    </p:spTree>
+    <p:extLst>
+      <p:ext uri="{BB962C8B-B14F-4D97-AF65-F5344CB8AC3E}">
+        <p14:creationId xmlns:p14="http://schemas.microsoft.com/office/powerpoint/2010/main" val="3593158269"/>
       </p:ext>
     </p:extLst>
   </p:cSld>
@@ -5459,6 +8557,321 @@
 </a:theme>
 </file>
 
+<file path=ppt/theme/theme2.xml><?xml version="1.0" encoding="utf-8"?>
+<a:theme xmlns:a="http://schemas.openxmlformats.org/drawingml/2006/main" name="Office Theme">
+  <a:themeElements>
+    <a:clrScheme name="Office">
+      <a:dk1>
+        <a:sysClr val="windowText" lastClr="000000"/>
+      </a:dk1>
+      <a:lt1>
+        <a:sysClr val="window" lastClr="FFFFFF"/>
+      </a:lt1>
+      <a:dk2>
+        <a:srgbClr val="0E2841"/>
+      </a:dk2>
+      <a:lt2>
+        <a:srgbClr val="E8E8E8"/>
+      </a:lt2>
+      <a:accent1>
+        <a:srgbClr val="156082"/>
+      </a:accent1>
+      <a:accent2>
+        <a:srgbClr val="E97132"/>
+      </a:accent2>
+      <a:accent3>
+        <a:srgbClr val="196B24"/>
+      </a:accent3>
+      <a:accent4>
+        <a:srgbClr val="0F9ED5"/>
+      </a:accent4>
+      <a:accent5>
+        <a:srgbClr val="A02B93"/>
+      </a:accent5>
+      <a:accent6>
+        <a:srgbClr val="4EA72E"/>
+      </a:accent6>
+      <a:hlink>
+        <a:srgbClr val="467886"/>
+      </a:hlink>
+      <a:folHlink>
+        <a:srgbClr val="96607D"/>
+      </a:folHlink>
+    </a:clrScheme>
+    <a:fontScheme name="Office">
+      <a:majorFont>
+        <a:latin typeface="Aptos Display" panose="02110004020202020204"/>
+        <a:ea typeface=""/>
+        <a:cs typeface=""/>
+        <a:font script="Jpan" typeface="游ゴシック Light"/>
+        <a:font script="Hang" typeface="맑은 고딕"/>
+        <a:font script="Hans" typeface="等线 Light"/>
+        <a:font script="Hant" typeface="新細明體"/>
+        <a:font script="Arab" typeface="Times New Roman"/>
+        <a:font script="Hebr" typeface="Times New Roman"/>
+        <a:font script="Thai" typeface="Angsana New"/>
+        <a:font script="Ethi" typeface="Nyala"/>
+        <a:font script="Beng" typeface="Vrinda"/>
+        <a:font script="Gujr" typeface="Shruti"/>
+        <a:font script="Khmr" typeface="MoolBoran"/>
+        <a:font script="Knda" typeface="Tunga"/>
+        <a:font script="Guru" typeface="Raavi"/>
+        <a:font script="Cans" typeface="Euphemia"/>
+        <a:font script="Cher" typeface="Plantagenet Cherokee"/>
+        <a:font script="Yiii" typeface="Microsoft Yi Baiti"/>
+        <a:font script="Tibt" typeface="Microsoft Himalaya"/>
+        <a:font script="Thaa" typeface="MV Boli"/>
+        <a:font script="Deva" typeface="Mangal"/>
+        <a:font script="Telu" typeface="Gautami"/>
+        <a:font script="Taml" typeface="Latha"/>
+        <a:font script="Syrc" typeface="Estrangelo Edessa"/>
+        <a:font script="Orya" typeface="Kalinga"/>
+        <a:font script="Mlym" typeface="Kartika"/>
+        <a:font script="Laoo" typeface="DokChampa"/>
+        <a:font script="Sinh" typeface="Iskoola Pota"/>
+        <a:font script="Mong" typeface="Mongolian Baiti"/>
+        <a:font script="Viet" typeface="Times New Roman"/>
+        <a:font script="Uigh" typeface="Microsoft Uighur"/>
+        <a:font script="Geor" typeface="Sylfaen"/>
+        <a:font script="Armn" typeface="Arial"/>
+        <a:font script="Bugi" typeface="Leelawadee UI"/>
+        <a:font script="Bopo" typeface="Microsoft JhengHei"/>
+        <a:font script="Java" typeface="Javanese Text"/>
+        <a:font script="Lisu" typeface="Segoe UI"/>
+        <a:font script="Mymr" typeface="Myanmar Text"/>
+        <a:font script="Nkoo" typeface="Ebrima"/>
+        <a:font script="Olck" typeface="Nirmala UI"/>
+        <a:font script="Osma" typeface="Ebrima"/>
+        <a:font script="Phag" typeface="Phagspa"/>
+        <a:font script="Syrn" typeface="Estrangelo Edessa"/>
+        <a:font script="Syrj" typeface="Estrangelo Edessa"/>
+        <a:font script="Syre" typeface="Estrangelo Edessa"/>
+        <a:font script="Sora" typeface="Nirmala UI"/>
+        <a:font script="Tale" typeface="Microsoft Tai Le"/>
+        <a:font script="Talu" typeface="Microsoft New Tai Lue"/>
+        <a:font script="Tfng" typeface="Ebrima"/>
+      </a:majorFont>
+      <a:minorFont>
+        <a:latin typeface="Aptos" panose="02110004020202020204"/>
+        <a:ea typeface=""/>
+        <a:cs typeface=""/>
+        <a:font script="Jpan" typeface="游ゴシック"/>
+        <a:font script="Hang" typeface="맑은 고딕"/>
+        <a:font script="Hans" typeface="等线"/>
+        <a:font script="Hant" typeface="新細明體"/>
+        <a:font script="Arab" typeface="Arial"/>
+        <a:font script="Hebr" typeface="Arial"/>
+        <a:font script="Thai" typeface="Cordia New"/>
+        <a:font script="Ethi" typeface="Nyala"/>
+        <a:font script="Beng" typeface="Vrinda"/>
+        <a:font script="Gujr" typeface="Shruti"/>
+        <a:font script="Khmr" typeface="DaunPenh"/>
+        <a:font script="Knda" typeface="Tunga"/>
+        <a:font script="Guru" typeface="Raavi"/>
+        <a:font script="Cans" typeface="Euphemia"/>
+        <a:font script="Cher" typeface="Plantagenet Cherokee"/>
+        <a:font script="Yiii" typeface="Microsoft Yi Baiti"/>
+        <a:font script="Tibt" typeface="Microsoft Himalaya"/>
+        <a:font script="Thaa" typeface="MV Boli"/>
+        <a:font script="Deva" typeface="Mangal"/>
+        <a:font script="Telu" typeface="Gautami"/>
+        <a:font script="Taml" typeface="Latha"/>
+        <a:font script="Syrc" typeface="Estrangelo Edessa"/>
+        <a:font script="Orya" typeface="Kalinga"/>
+        <a:font script="Mlym" typeface="Kartika"/>
+        <a:font script="Laoo" typeface="DokChampa"/>
+        <a:font script="Sinh" typeface="Iskoola Pota"/>
+        <a:font script="Mong" typeface="Mongolian Baiti"/>
+        <a:font script="Viet" typeface="Arial"/>
+        <a:font script="Uigh" typeface="Microsoft Uighur"/>
+        <a:font script="Geor" typeface="Sylfaen"/>
+        <a:font script="Armn" typeface="Arial"/>
+        <a:font script="Bugi" typeface="Leelawadee UI"/>
+        <a:font script="Bopo" typeface="Microsoft JhengHei"/>
+        <a:font script="Java" typeface="Javanese Text"/>
+        <a:font script="Lisu" typeface="Segoe UI"/>
+        <a:font script="Mymr" typeface="Myanmar Text"/>
+        <a:font script="Nkoo" typeface="Ebrima"/>
+        <a:font script="Olck" typeface="Nirmala UI"/>
+        <a:font script="Osma" typeface="Ebrima"/>
+        <a:font script="Phag" typeface="Phagspa"/>
+        <a:font script="Syrn" typeface="Estrangelo Edessa"/>
+        <a:font script="Syrj" typeface="Estrangelo Edessa"/>
+        <a:font script="Syre" typeface="Estrangelo Edessa"/>
+        <a:font script="Sora" typeface="Nirmala UI"/>
+        <a:font script="Tale" typeface="Microsoft Tai Le"/>
+        <a:font script="Talu" typeface="Microsoft New Tai Lue"/>
+        <a:font script="Tfng" typeface="Ebrima"/>
+      </a:minorFont>
+    </a:fontScheme>
+    <a:fmtScheme name="Office">
+      <a:fillStyleLst>
+        <a:solidFill>
+          <a:schemeClr val="phClr"/>
+        </a:solidFill>
+        <a:gradFill rotWithShape="1">
+          <a:gsLst>
+            <a:gs pos="0">
+              <a:schemeClr val="phClr">
+                <a:lumMod val="110000"/>
+                <a:satMod val="105000"/>
+                <a:tint val="67000"/>
+              </a:schemeClr>
+            </a:gs>
+            <a:gs pos="50000">
+              <a:schemeClr val="phClr">
+                <a:lumMod val="105000"/>
+                <a:satMod val="103000"/>
+                <a:tint val="73000"/>
+              </a:schemeClr>
+            </a:gs>
+            <a:gs pos="100000">
+              <a:schemeClr val="phClr">
+                <a:lumMod val="105000"/>
+                <a:satMod val="109000"/>
+                <a:tint val="81000"/>
+              </a:schemeClr>
+            </a:gs>
+          </a:gsLst>
+          <a:lin ang="5400000" scaled="0"/>
+        </a:gradFill>
+        <a:gradFill rotWithShape="1">
+          <a:gsLst>
+            <a:gs pos="0">
+              <a:schemeClr val="phClr">
+                <a:satMod val="103000"/>
+                <a:lumMod val="102000"/>
+                <a:tint val="94000"/>
+              </a:schemeClr>
+            </a:gs>
+            <a:gs pos="50000">
+              <a:schemeClr val="phClr">
+                <a:satMod val="110000"/>
+                <a:lumMod val="100000"/>
+                <a:shade val="100000"/>
+              </a:schemeClr>
+            </a:gs>
+            <a:gs pos="100000">
+              <a:schemeClr val="phClr">
+                <a:lumMod val="99000"/>
+                <a:satMod val="120000"/>
+                <a:shade val="78000"/>
+              </a:schemeClr>
+            </a:gs>
+          </a:gsLst>
+          <a:lin ang="5400000" scaled="0"/>
+        </a:gradFill>
+      </a:fillStyleLst>
+      <a:lnStyleLst>
+        <a:ln w="12700" cap="flat" cmpd="sng" algn="ctr">
+          <a:solidFill>
+            <a:schemeClr val="phClr"/>
+          </a:solidFill>
+          <a:prstDash val="solid"/>
+          <a:miter lim="800000"/>
+        </a:ln>
+        <a:ln w="19050" cap="flat" cmpd="sng" algn="ctr">
+          <a:solidFill>
+            <a:schemeClr val="phClr"/>
+          </a:solidFill>
+          <a:prstDash val="solid"/>
+          <a:miter lim="800000"/>
+        </a:ln>
+        <a:ln w="25400" cap="flat" cmpd="sng" algn="ctr">
+          <a:solidFill>
+            <a:schemeClr val="phClr"/>
+          </a:solidFill>
+          <a:prstDash val="solid"/>
+          <a:miter lim="800000"/>
+        </a:ln>
+      </a:lnStyleLst>
+      <a:effectStyleLst>
+        <a:effectStyle>
+          <a:effectLst/>
+        </a:effectStyle>
+        <a:effectStyle>
+          <a:effectLst/>
+        </a:effectStyle>
+        <a:effectStyle>
+          <a:effectLst>
+            <a:outerShdw blurRad="57150" dist="19050" dir="5400000" algn="ctr" rotWithShape="0">
+              <a:srgbClr val="000000">
+                <a:alpha val="63000"/>
+              </a:srgbClr>
+            </a:outerShdw>
+          </a:effectLst>
+        </a:effectStyle>
+      </a:effectStyleLst>
+      <a:bgFillStyleLst>
+        <a:solidFill>
+          <a:schemeClr val="phClr"/>
+        </a:solidFill>
+        <a:solidFill>
+          <a:schemeClr val="phClr">
+            <a:tint val="95000"/>
+            <a:satMod val="170000"/>
+          </a:schemeClr>
+        </a:solidFill>
+        <a:gradFill rotWithShape="1">
+          <a:gsLst>
+            <a:gs pos="0">
+              <a:schemeClr val="phClr">
+                <a:tint val="93000"/>
+                <a:satMod val="150000"/>
+                <a:shade val="98000"/>
+                <a:lumMod val="102000"/>
+              </a:schemeClr>
+            </a:gs>
+            <a:gs pos="50000">
+              <a:schemeClr val="phClr">
+                <a:tint val="98000"/>
+                <a:satMod val="130000"/>
+                <a:shade val="90000"/>
+                <a:lumMod val="103000"/>
+              </a:schemeClr>
+            </a:gs>
+            <a:gs pos="100000">
+              <a:schemeClr val="phClr">
+                <a:shade val="63000"/>
+                <a:satMod val="120000"/>
+              </a:schemeClr>
+            </a:gs>
+          </a:gsLst>
+          <a:lin ang="5400000" scaled="0"/>
+        </a:gradFill>
+      </a:bgFillStyleLst>
+    </a:fmtScheme>
+  </a:themeElements>
+  <a:objectDefaults>
+    <a:lnDef>
+      <a:spPr/>
+      <a:bodyPr/>
+      <a:lstStyle/>
+      <a:style>
+        <a:lnRef idx="2">
+          <a:schemeClr val="accent1"/>
+        </a:lnRef>
+        <a:fillRef idx="0">
+          <a:schemeClr val="accent1"/>
+        </a:fillRef>
+        <a:effectRef idx="1">
+          <a:schemeClr val="accent1"/>
+        </a:effectRef>
+        <a:fontRef idx="minor">
+          <a:schemeClr val="tx1"/>
+        </a:fontRef>
+      </a:style>
+    </a:lnDef>
+  </a:objectDefaults>
+  <a:extraClrSchemeLst/>
+  <a:extLst>
+    <a:ext uri="{05A4C25C-085E-4340-85A3-A5531E510DB2}">
+      <thm15:themeFamily xmlns:thm15="http://schemas.microsoft.com/office/thememl/2012/main" name="Office Theme" id="{2E142A2C-CD16-42D6-873A-C26D2A0506FA}" vid="{1BDDFF52-6CD6-40A5-AB3C-68EB2F1E4D0A}"/>
+    </a:ext>
+  </a:extLst>
+</a:theme>
+</file>
+
 <file path=docMetadata/LabelInfo.xml><?xml version="1.0" encoding="utf-8"?>
 <clbl:labelList xmlns:clbl="http://schemas.microsoft.com/office/2020/mipLabelMetadata">
   <clbl:label id="{f42aa342-8706-4288-bd11-ebb85995028c}" enabled="1" method="Standard" siteId="{72f988bf-86f1-41af-91ab-2d7cd011db47}" contentBits="0" removed="0"/>

</xml_diff>